<commit_message>
Updated CNN, Presentation, Added Viz
</commit_message>
<xml_diff>
--- a/presentation.pptx
+++ b/presentation.pptx
@@ -8,12 +8,17 @@
     <p:sldId id="256" r:id="rId2"/>
     <p:sldId id="257" r:id="rId3"/>
     <p:sldId id="258" r:id="rId4"/>
-    <p:sldId id="259" r:id="rId5"/>
-    <p:sldId id="260" r:id="rId6"/>
-    <p:sldId id="262" r:id="rId7"/>
-    <p:sldId id="263" r:id="rId8"/>
-    <p:sldId id="264" r:id="rId9"/>
-    <p:sldId id="265" r:id="rId10"/>
+    <p:sldId id="266" r:id="rId5"/>
+    <p:sldId id="259" r:id="rId6"/>
+    <p:sldId id="268" r:id="rId7"/>
+    <p:sldId id="260" r:id="rId8"/>
+    <p:sldId id="269" r:id="rId9"/>
+    <p:sldId id="262" r:id="rId10"/>
+    <p:sldId id="263" r:id="rId11"/>
+    <p:sldId id="264" r:id="rId12"/>
+    <p:sldId id="265" r:id="rId13"/>
+    <p:sldId id="267" r:id="rId14"/>
+    <p:sldId id="270" r:id="rId15"/>
   </p:sldIdLst>
   <p:sldSz cx="12192000" cy="6858000"/>
   <p:notesSz cx="6858000" cy="9144000"/>
@@ -112,6 +117,11 @@
       </a:defRPr>
     </a:lvl9pPr>
   </p:defaultTextStyle>
+  <p:extLst>
+    <p:ext uri="{EFAFB233-063F-42B5-8137-9DF3F51BA10A}">
+      <p15:sldGuideLst xmlns:p15="http://schemas.microsoft.com/office/powerpoint/2012/main"/>
+    </p:ext>
+  </p:extLst>
 </p:presentation>
 </file>
 
@@ -262,7 +272,7 @@
           <a:p>
             <a:fld id="{31E4BB51-2F5F-4BB9-9845-9C1B3BC9B506}" type="datetimeFigureOut">
               <a:rPr lang="en-US" smtClean="0"/>
-              <a:t>8/24/2021</a:t>
+              <a:t>8/25/2021</a:t>
             </a:fld>
             <a:endParaRPr lang="en-US"/>
           </a:p>
@@ -460,7 +470,7 @@
           <a:p>
             <a:fld id="{31E4BB51-2F5F-4BB9-9845-9C1B3BC9B506}" type="datetimeFigureOut">
               <a:rPr lang="en-US" smtClean="0"/>
-              <a:t>8/24/2021</a:t>
+              <a:t>8/25/2021</a:t>
             </a:fld>
             <a:endParaRPr lang="en-US"/>
           </a:p>
@@ -668,7 +678,7 @@
           <a:p>
             <a:fld id="{31E4BB51-2F5F-4BB9-9845-9C1B3BC9B506}" type="datetimeFigureOut">
               <a:rPr lang="en-US" smtClean="0"/>
-              <a:t>8/24/2021</a:t>
+              <a:t>8/25/2021</a:t>
             </a:fld>
             <a:endParaRPr lang="en-US"/>
           </a:p>
@@ -866,7 +876,7 @@
           <a:p>
             <a:fld id="{31E4BB51-2F5F-4BB9-9845-9C1B3BC9B506}" type="datetimeFigureOut">
               <a:rPr lang="en-US" smtClean="0"/>
-              <a:t>8/24/2021</a:t>
+              <a:t>8/25/2021</a:t>
             </a:fld>
             <a:endParaRPr lang="en-US"/>
           </a:p>
@@ -1141,7 +1151,7 @@
           <a:p>
             <a:fld id="{31E4BB51-2F5F-4BB9-9845-9C1B3BC9B506}" type="datetimeFigureOut">
               <a:rPr lang="en-US" smtClean="0"/>
-              <a:t>8/24/2021</a:t>
+              <a:t>8/25/2021</a:t>
             </a:fld>
             <a:endParaRPr lang="en-US"/>
           </a:p>
@@ -1406,7 +1416,7 @@
           <a:p>
             <a:fld id="{31E4BB51-2F5F-4BB9-9845-9C1B3BC9B506}" type="datetimeFigureOut">
               <a:rPr lang="en-US" smtClean="0"/>
-              <a:t>8/24/2021</a:t>
+              <a:t>8/25/2021</a:t>
             </a:fld>
             <a:endParaRPr lang="en-US"/>
           </a:p>
@@ -1818,7 +1828,7 @@
           <a:p>
             <a:fld id="{31E4BB51-2F5F-4BB9-9845-9C1B3BC9B506}" type="datetimeFigureOut">
               <a:rPr lang="en-US" smtClean="0"/>
-              <a:t>8/24/2021</a:t>
+              <a:t>8/25/2021</a:t>
             </a:fld>
             <a:endParaRPr lang="en-US"/>
           </a:p>
@@ -1959,7 +1969,7 @@
           <a:p>
             <a:fld id="{31E4BB51-2F5F-4BB9-9845-9C1B3BC9B506}" type="datetimeFigureOut">
               <a:rPr lang="en-US" smtClean="0"/>
-              <a:t>8/24/2021</a:t>
+              <a:t>8/25/2021</a:t>
             </a:fld>
             <a:endParaRPr lang="en-US"/>
           </a:p>
@@ -2072,7 +2082,7 @@
           <a:p>
             <a:fld id="{31E4BB51-2F5F-4BB9-9845-9C1B3BC9B506}" type="datetimeFigureOut">
               <a:rPr lang="en-US" smtClean="0"/>
-              <a:t>8/24/2021</a:t>
+              <a:t>8/25/2021</a:t>
             </a:fld>
             <a:endParaRPr lang="en-US"/>
           </a:p>
@@ -2383,7 +2393,7 @@
           <a:p>
             <a:fld id="{31E4BB51-2F5F-4BB9-9845-9C1B3BC9B506}" type="datetimeFigureOut">
               <a:rPr lang="en-US" smtClean="0"/>
-              <a:t>8/24/2021</a:t>
+              <a:t>8/25/2021</a:t>
             </a:fld>
             <a:endParaRPr lang="en-US"/>
           </a:p>
@@ -2671,7 +2681,7 @@
           <a:p>
             <a:fld id="{31E4BB51-2F5F-4BB9-9845-9C1B3BC9B506}" type="datetimeFigureOut">
               <a:rPr lang="en-US" smtClean="0"/>
-              <a:t>8/24/2021</a:t>
+              <a:t>8/25/2021</a:t>
             </a:fld>
             <a:endParaRPr lang="en-US"/>
           </a:p>
@@ -2912,7 +2922,7 @@
           <a:p>
             <a:fld id="{31E4BB51-2F5F-4BB9-9845-9C1B3BC9B506}" type="datetimeFigureOut">
               <a:rPr lang="en-US" smtClean="0"/>
-              <a:t>8/24/2021</a:t>
+              <a:t>8/25/2021</a:t>
             </a:fld>
             <a:endParaRPr lang="en-US"/>
           </a:p>
@@ -3413,6 +3423,898 @@
 </p:sld>
 </file>
 
+<file path=ppt/slides/slide10.xml><?xml version="1.0" encoding="utf-8"?>
+<p:sld xmlns:a="http://schemas.openxmlformats.org/drawingml/2006/main" xmlns:r="http://schemas.openxmlformats.org/officeDocument/2006/relationships" xmlns:p="http://schemas.openxmlformats.org/presentationml/2006/main">
+  <p:cSld>
+    <p:spTree>
+      <p:nvGrpSpPr>
+        <p:cNvPr id="1" name=""/>
+        <p:cNvGrpSpPr/>
+        <p:nvPr/>
+      </p:nvGrpSpPr>
+      <p:grpSpPr>
+        <a:xfrm>
+          <a:off x="0" y="0"/>
+          <a:ext cx="0" cy="0"/>
+          <a:chOff x="0" y="0"/>
+          <a:chExt cx="0" cy="0"/>
+        </a:xfrm>
+      </p:grpSpPr>
+      <p:pic>
+        <p:nvPicPr>
+          <p:cNvPr id="4" name="Picture 3" descr="Graphical user interface&#10;&#10;Description automatically generated with low confidence">
+            <a:extLst>
+              <a:ext uri="{FF2B5EF4-FFF2-40B4-BE49-F238E27FC236}">
+                <a16:creationId xmlns:a16="http://schemas.microsoft.com/office/drawing/2014/main" id="{67589DDA-5F03-4484-917D-713A6F7D2DD7}"/>
+              </a:ext>
+            </a:extLst>
+          </p:cNvPr>
+          <p:cNvPicPr>
+            <a:picLocks noChangeAspect="1"/>
+          </p:cNvPicPr>
+          <p:nvPr/>
+        </p:nvPicPr>
+        <p:blipFill>
+          <a:blip r:embed="rId2">
+            <a:extLst>
+              <a:ext uri="{28A0092B-C50C-407E-A947-70E740481C1C}">
+                <a14:useLocalDpi xmlns:a14="http://schemas.microsoft.com/office/drawing/2010/main" val="0"/>
+              </a:ext>
+            </a:extLst>
+          </a:blip>
+          <a:stretch>
+            <a:fillRect/>
+          </a:stretch>
+        </p:blipFill>
+        <p:spPr>
+          <a:xfrm>
+            <a:off x="5040000" y="0"/>
+            <a:ext cx="6858000" cy="6858000"/>
+          </a:xfrm>
+          <a:prstGeom prst="rect">
+            <a:avLst/>
+          </a:prstGeom>
+        </p:spPr>
+      </p:pic>
+      <p:grpSp>
+        <p:nvGrpSpPr>
+          <p:cNvPr id="8" name="Group 7">
+            <a:extLst>
+              <a:ext uri="{FF2B5EF4-FFF2-40B4-BE49-F238E27FC236}">
+                <a16:creationId xmlns:a16="http://schemas.microsoft.com/office/drawing/2014/main" id="{AE995982-50A4-4703-94DE-6D84E36FA082}"/>
+              </a:ext>
+            </a:extLst>
+          </p:cNvPr>
+          <p:cNvGrpSpPr/>
+          <p:nvPr/>
+        </p:nvGrpSpPr>
+        <p:grpSpPr>
+          <a:xfrm>
+            <a:off x="1260000" y="1843481"/>
+            <a:ext cx="2692866" cy="3171038"/>
+            <a:chOff x="2768368" y="1843481"/>
+            <a:chExt cx="2692866" cy="3171038"/>
+          </a:xfrm>
+        </p:grpSpPr>
+        <p:sp>
+          <p:nvSpPr>
+            <p:cNvPr id="9" name="Rectangle 8">
+              <a:extLst>
+                <a:ext uri="{FF2B5EF4-FFF2-40B4-BE49-F238E27FC236}">
+                  <a16:creationId xmlns:a16="http://schemas.microsoft.com/office/drawing/2014/main" id="{964E9DF3-C2E9-4719-A5BC-C585CA206D26}"/>
+                </a:ext>
+              </a:extLst>
+            </p:cNvPr>
+            <p:cNvSpPr/>
+            <p:nvPr/>
+          </p:nvSpPr>
+          <p:spPr>
+            <a:xfrm>
+              <a:off x="2768368" y="1843481"/>
+              <a:ext cx="2692866" cy="3171038"/>
+            </a:xfrm>
+            <a:prstGeom prst="rect">
+              <a:avLst/>
+            </a:prstGeom>
+            <a:ln w="12700" cmpd="sng">
+              <a:round/>
+            </a:ln>
+            <a:effectLst/>
+          </p:spPr>
+          <p:style>
+            <a:lnRef idx="2">
+              <a:schemeClr val="accent1">
+                <a:shade val="50000"/>
+              </a:schemeClr>
+            </a:lnRef>
+            <a:fillRef idx="1">
+              <a:schemeClr val="accent1"/>
+            </a:fillRef>
+            <a:effectRef idx="0">
+              <a:schemeClr val="accent1"/>
+            </a:effectRef>
+            <a:fontRef idx="minor">
+              <a:schemeClr val="lt1"/>
+            </a:fontRef>
+          </p:style>
+          <p:txBody>
+            <a:bodyPr rtlCol="0" anchor="ctr"/>
+            <a:lstStyle/>
+            <a:p>
+              <a:pPr algn="ctr"/>
+              <a:r>
+                <a:rPr lang="en-US" dirty="0">
+                  <a:latin typeface="Avenir Next LT Pro" panose="020B0504020202020204" pitchFamily="34" charset="0"/>
+                </a:rPr>
+                <a:t>No Filter</a:t>
+              </a:r>
+            </a:p>
+          </p:txBody>
+        </p:sp>
+        <p:cxnSp>
+          <p:nvCxnSpPr>
+            <p:cNvPr id="10" name="Straight Connector 9">
+              <a:extLst>
+                <a:ext uri="{FF2B5EF4-FFF2-40B4-BE49-F238E27FC236}">
+                  <a16:creationId xmlns:a16="http://schemas.microsoft.com/office/drawing/2014/main" id="{F6C26B6A-54AF-4327-883B-E00A3FEF2E5B}"/>
+                </a:ext>
+              </a:extLst>
+            </p:cNvPr>
+            <p:cNvCxnSpPr>
+              <a:cxnSpLocks/>
+            </p:cNvCxnSpPr>
+            <p:nvPr/>
+          </p:nvCxnSpPr>
+          <p:spPr>
+            <a:xfrm>
+              <a:off x="3191070" y="2472612"/>
+              <a:ext cx="1872000" cy="0"/>
+            </a:xfrm>
+            <a:prstGeom prst="line">
+              <a:avLst/>
+            </a:prstGeom>
+            <a:ln w="25400">
+              <a:solidFill>
+                <a:schemeClr val="bg1"/>
+              </a:solidFill>
+            </a:ln>
+          </p:spPr>
+          <p:style>
+            <a:lnRef idx="1">
+              <a:schemeClr val="accent1"/>
+            </a:lnRef>
+            <a:fillRef idx="0">
+              <a:schemeClr val="accent1"/>
+            </a:fillRef>
+            <a:effectRef idx="0">
+              <a:schemeClr val="accent1"/>
+            </a:effectRef>
+            <a:fontRef idx="minor">
+              <a:schemeClr val="tx1"/>
+            </a:fontRef>
+          </p:style>
+        </p:cxnSp>
+        <p:sp>
+          <p:nvSpPr>
+            <p:cNvPr id="11" name="TextBox 10">
+              <a:extLst>
+                <a:ext uri="{FF2B5EF4-FFF2-40B4-BE49-F238E27FC236}">
+                  <a16:creationId xmlns:a16="http://schemas.microsoft.com/office/drawing/2014/main" id="{8FFC9DCE-0E50-48B6-8BC7-66A49548E687}"/>
+                </a:ext>
+              </a:extLst>
+            </p:cNvPr>
+            <p:cNvSpPr txBox="1"/>
+            <p:nvPr/>
+          </p:nvSpPr>
+          <p:spPr>
+            <a:xfrm>
+              <a:off x="3277984" y="1973381"/>
+              <a:ext cx="1698171" cy="369332"/>
+            </a:xfrm>
+            <a:prstGeom prst="rect">
+              <a:avLst/>
+            </a:prstGeom>
+            <a:noFill/>
+          </p:spPr>
+          <p:txBody>
+            <a:bodyPr wrap="square" rtlCol="0">
+              <a:spAutoFit/>
+            </a:bodyPr>
+            <a:lstStyle/>
+            <a:p>
+              <a:pPr algn="ctr"/>
+              <a:r>
+                <a:rPr lang="en-US" dirty="0">
+                  <a:solidFill>
+                    <a:schemeClr val="bg1"/>
+                  </a:solidFill>
+                  <a:latin typeface="Avenir LT Std 65 Medium" panose="020B0803020203020204" pitchFamily="34" charset="0"/>
+                </a:rPr>
+                <a:t>Dataset 1</a:t>
+              </a:r>
+            </a:p>
+          </p:txBody>
+        </p:sp>
+      </p:grpSp>
+    </p:spTree>
+    <p:extLst>
+      <p:ext uri="{BB962C8B-B14F-4D97-AF65-F5344CB8AC3E}">
+        <p14:creationId xmlns:p14="http://schemas.microsoft.com/office/powerpoint/2010/main" val="1920912514"/>
+      </p:ext>
+    </p:extLst>
+  </p:cSld>
+  <p:clrMapOvr>
+    <a:masterClrMapping/>
+  </p:clrMapOvr>
+</p:sld>
+</file>
+
+<file path=ppt/slides/slide11.xml><?xml version="1.0" encoding="utf-8"?>
+<p:sld xmlns:a="http://schemas.openxmlformats.org/drawingml/2006/main" xmlns:r="http://schemas.openxmlformats.org/officeDocument/2006/relationships" xmlns:p="http://schemas.openxmlformats.org/presentationml/2006/main">
+  <p:cSld>
+    <p:spTree>
+      <p:nvGrpSpPr>
+        <p:cNvPr id="1" name=""/>
+        <p:cNvGrpSpPr/>
+        <p:nvPr/>
+      </p:nvGrpSpPr>
+      <p:grpSpPr>
+        <a:xfrm>
+          <a:off x="0" y="0"/>
+          <a:ext cx="0" cy="0"/>
+          <a:chOff x="0" y="0"/>
+          <a:chExt cx="0" cy="0"/>
+        </a:xfrm>
+      </p:grpSpPr>
+      <p:pic>
+        <p:nvPicPr>
+          <p:cNvPr id="3" name="Picture 2" descr="A picture containing graphical user interface&#10;&#10;Description automatically generated">
+            <a:extLst>
+              <a:ext uri="{FF2B5EF4-FFF2-40B4-BE49-F238E27FC236}">
+                <a16:creationId xmlns:a16="http://schemas.microsoft.com/office/drawing/2014/main" id="{181E4A29-1C59-4104-971B-35863BC00435}"/>
+              </a:ext>
+            </a:extLst>
+          </p:cNvPr>
+          <p:cNvPicPr>
+            <a:picLocks noChangeAspect="1"/>
+          </p:cNvPicPr>
+          <p:nvPr/>
+        </p:nvPicPr>
+        <p:blipFill>
+          <a:blip r:embed="rId2">
+            <a:extLst>
+              <a:ext uri="{28A0092B-C50C-407E-A947-70E740481C1C}">
+                <a14:useLocalDpi xmlns:a14="http://schemas.microsoft.com/office/drawing/2010/main" val="0"/>
+              </a:ext>
+            </a:extLst>
+          </a:blip>
+          <a:stretch>
+            <a:fillRect/>
+          </a:stretch>
+        </p:blipFill>
+        <p:spPr>
+          <a:xfrm>
+            <a:off x="5040000" y="0"/>
+            <a:ext cx="6858000" cy="6858000"/>
+          </a:xfrm>
+          <a:prstGeom prst="rect">
+            <a:avLst/>
+          </a:prstGeom>
+        </p:spPr>
+      </p:pic>
+      <p:grpSp>
+        <p:nvGrpSpPr>
+          <p:cNvPr id="8" name="Group 7">
+            <a:extLst>
+              <a:ext uri="{FF2B5EF4-FFF2-40B4-BE49-F238E27FC236}">
+                <a16:creationId xmlns:a16="http://schemas.microsoft.com/office/drawing/2014/main" id="{67F1E1DA-E5CC-49BE-965A-EDF229AE296E}"/>
+              </a:ext>
+            </a:extLst>
+          </p:cNvPr>
+          <p:cNvGrpSpPr/>
+          <p:nvPr/>
+        </p:nvGrpSpPr>
+        <p:grpSpPr>
+          <a:xfrm>
+            <a:off x="1260000" y="1843481"/>
+            <a:ext cx="2692866" cy="3171038"/>
+            <a:chOff x="2768368" y="1843481"/>
+            <a:chExt cx="2692866" cy="3171038"/>
+          </a:xfrm>
+        </p:grpSpPr>
+        <p:sp>
+          <p:nvSpPr>
+            <p:cNvPr id="9" name="Rectangle 8">
+              <a:extLst>
+                <a:ext uri="{FF2B5EF4-FFF2-40B4-BE49-F238E27FC236}">
+                  <a16:creationId xmlns:a16="http://schemas.microsoft.com/office/drawing/2014/main" id="{AE93416D-AA1A-410D-84EC-34C1085C4D89}"/>
+                </a:ext>
+              </a:extLst>
+            </p:cNvPr>
+            <p:cNvSpPr/>
+            <p:nvPr/>
+          </p:nvSpPr>
+          <p:spPr>
+            <a:xfrm>
+              <a:off x="2768368" y="1843481"/>
+              <a:ext cx="2692866" cy="3171038"/>
+            </a:xfrm>
+            <a:prstGeom prst="rect">
+              <a:avLst/>
+            </a:prstGeom>
+          </p:spPr>
+          <p:style>
+            <a:lnRef idx="2">
+              <a:schemeClr val="accent1">
+                <a:shade val="50000"/>
+              </a:schemeClr>
+            </a:lnRef>
+            <a:fillRef idx="1">
+              <a:schemeClr val="accent1"/>
+            </a:fillRef>
+            <a:effectRef idx="0">
+              <a:schemeClr val="accent1"/>
+            </a:effectRef>
+            <a:fontRef idx="minor">
+              <a:schemeClr val="lt1"/>
+            </a:fontRef>
+          </p:style>
+          <p:txBody>
+            <a:bodyPr rtlCol="0" anchor="ctr"/>
+            <a:lstStyle/>
+            <a:p>
+              <a:pPr algn="ctr"/>
+              <a:r>
+                <a:rPr lang="en-US" dirty="0">
+                  <a:latin typeface="Avenir Next LT Pro" panose="020B0504020202020204" pitchFamily="34" charset="0"/>
+                </a:rPr>
+                <a:t>Sample Size Threshold:</a:t>
+              </a:r>
+            </a:p>
+            <a:p>
+              <a:pPr algn="ctr"/>
+              <a:r>
+                <a:rPr lang="en-US" b="1" dirty="0">
+                  <a:latin typeface="Avenir Next LT Pro" panose="020B0504020202020204" pitchFamily="34" charset="0"/>
+                </a:rPr>
+                <a:t>50</a:t>
+              </a:r>
+            </a:p>
+          </p:txBody>
+        </p:sp>
+        <p:cxnSp>
+          <p:nvCxnSpPr>
+            <p:cNvPr id="10" name="Straight Connector 9">
+              <a:extLst>
+                <a:ext uri="{FF2B5EF4-FFF2-40B4-BE49-F238E27FC236}">
+                  <a16:creationId xmlns:a16="http://schemas.microsoft.com/office/drawing/2014/main" id="{73ECC480-D86B-4154-9046-841DA54F401C}"/>
+                </a:ext>
+              </a:extLst>
+            </p:cNvPr>
+            <p:cNvCxnSpPr>
+              <a:cxnSpLocks/>
+            </p:cNvCxnSpPr>
+            <p:nvPr/>
+          </p:nvCxnSpPr>
+          <p:spPr>
+            <a:xfrm>
+              <a:off x="3191070" y="2472612"/>
+              <a:ext cx="1872000" cy="0"/>
+            </a:xfrm>
+            <a:prstGeom prst="line">
+              <a:avLst/>
+            </a:prstGeom>
+            <a:ln w="25400">
+              <a:solidFill>
+                <a:schemeClr val="bg1"/>
+              </a:solidFill>
+            </a:ln>
+          </p:spPr>
+          <p:style>
+            <a:lnRef idx="1">
+              <a:schemeClr val="accent1"/>
+            </a:lnRef>
+            <a:fillRef idx="0">
+              <a:schemeClr val="accent1"/>
+            </a:fillRef>
+            <a:effectRef idx="0">
+              <a:schemeClr val="accent1"/>
+            </a:effectRef>
+            <a:fontRef idx="minor">
+              <a:schemeClr val="tx1"/>
+            </a:fontRef>
+          </p:style>
+        </p:cxnSp>
+        <p:sp>
+          <p:nvSpPr>
+            <p:cNvPr id="11" name="TextBox 10">
+              <a:extLst>
+                <a:ext uri="{FF2B5EF4-FFF2-40B4-BE49-F238E27FC236}">
+                  <a16:creationId xmlns:a16="http://schemas.microsoft.com/office/drawing/2014/main" id="{93E0476C-AD3C-485C-B144-07542E3ED34B}"/>
+                </a:ext>
+              </a:extLst>
+            </p:cNvPr>
+            <p:cNvSpPr txBox="1"/>
+            <p:nvPr/>
+          </p:nvSpPr>
+          <p:spPr>
+            <a:xfrm>
+              <a:off x="3277984" y="1973381"/>
+              <a:ext cx="1698171" cy="369332"/>
+            </a:xfrm>
+            <a:prstGeom prst="rect">
+              <a:avLst/>
+            </a:prstGeom>
+            <a:noFill/>
+          </p:spPr>
+          <p:txBody>
+            <a:bodyPr wrap="square" rtlCol="0">
+              <a:spAutoFit/>
+            </a:bodyPr>
+            <a:lstStyle/>
+            <a:p>
+              <a:pPr algn="ctr"/>
+              <a:r>
+                <a:rPr lang="en-US" dirty="0">
+                  <a:solidFill>
+                    <a:schemeClr val="bg1"/>
+                  </a:solidFill>
+                  <a:latin typeface="Avenir LT Std 65 Medium" panose="020B0803020203020204" pitchFamily="34" charset="0"/>
+                </a:rPr>
+                <a:t>Dataset 2</a:t>
+              </a:r>
+            </a:p>
+          </p:txBody>
+        </p:sp>
+      </p:grpSp>
+    </p:spTree>
+    <p:extLst>
+      <p:ext uri="{BB962C8B-B14F-4D97-AF65-F5344CB8AC3E}">
+        <p14:creationId xmlns:p14="http://schemas.microsoft.com/office/powerpoint/2010/main" val="3743300472"/>
+      </p:ext>
+    </p:extLst>
+  </p:cSld>
+  <p:clrMapOvr>
+    <a:masterClrMapping/>
+  </p:clrMapOvr>
+</p:sld>
+</file>
+
+<file path=ppt/slides/slide12.xml><?xml version="1.0" encoding="utf-8"?>
+<p:sld xmlns:a="http://schemas.openxmlformats.org/drawingml/2006/main" xmlns:r="http://schemas.openxmlformats.org/officeDocument/2006/relationships" xmlns:p="http://schemas.openxmlformats.org/presentationml/2006/main">
+  <p:cSld>
+    <p:spTree>
+      <p:nvGrpSpPr>
+        <p:cNvPr id="1" name=""/>
+        <p:cNvGrpSpPr/>
+        <p:nvPr/>
+      </p:nvGrpSpPr>
+      <p:grpSpPr>
+        <a:xfrm>
+          <a:off x="0" y="0"/>
+          <a:ext cx="0" cy="0"/>
+          <a:chOff x="0" y="0"/>
+          <a:chExt cx="0" cy="0"/>
+        </a:xfrm>
+      </p:grpSpPr>
+      <p:pic>
+        <p:nvPicPr>
+          <p:cNvPr id="3" name="Picture 2" descr="A picture containing chart&#10;&#10;Description automatically generated">
+            <a:extLst>
+              <a:ext uri="{FF2B5EF4-FFF2-40B4-BE49-F238E27FC236}">
+                <a16:creationId xmlns:a16="http://schemas.microsoft.com/office/drawing/2014/main" id="{359E25E3-49C7-4454-9B10-2DF59B568B7A}"/>
+              </a:ext>
+            </a:extLst>
+          </p:cNvPr>
+          <p:cNvPicPr>
+            <a:picLocks noChangeAspect="1"/>
+          </p:cNvPicPr>
+          <p:nvPr/>
+        </p:nvPicPr>
+        <p:blipFill>
+          <a:blip r:embed="rId2">
+            <a:extLst>
+              <a:ext uri="{28A0092B-C50C-407E-A947-70E740481C1C}">
+                <a14:useLocalDpi xmlns:a14="http://schemas.microsoft.com/office/drawing/2010/main" val="0"/>
+              </a:ext>
+            </a:extLst>
+          </a:blip>
+          <a:stretch>
+            <a:fillRect/>
+          </a:stretch>
+        </p:blipFill>
+        <p:spPr>
+          <a:xfrm>
+            <a:off x="5040000" y="0"/>
+            <a:ext cx="6858000" cy="6858000"/>
+          </a:xfrm>
+          <a:prstGeom prst="rect">
+            <a:avLst/>
+          </a:prstGeom>
+        </p:spPr>
+      </p:pic>
+      <p:grpSp>
+        <p:nvGrpSpPr>
+          <p:cNvPr id="4" name="Group 3">
+            <a:extLst>
+              <a:ext uri="{FF2B5EF4-FFF2-40B4-BE49-F238E27FC236}">
+                <a16:creationId xmlns:a16="http://schemas.microsoft.com/office/drawing/2014/main" id="{C25392F3-9B59-444F-AE65-21FFAC7B8B28}"/>
+              </a:ext>
+            </a:extLst>
+          </p:cNvPr>
+          <p:cNvGrpSpPr/>
+          <p:nvPr/>
+        </p:nvGrpSpPr>
+        <p:grpSpPr>
+          <a:xfrm>
+            <a:off x="1260000" y="1843481"/>
+            <a:ext cx="2692866" cy="3171038"/>
+            <a:chOff x="2768368" y="1843481"/>
+            <a:chExt cx="2692866" cy="3171038"/>
+          </a:xfrm>
+        </p:grpSpPr>
+        <p:sp>
+          <p:nvSpPr>
+            <p:cNvPr id="5" name="Rectangle 4">
+              <a:extLst>
+                <a:ext uri="{FF2B5EF4-FFF2-40B4-BE49-F238E27FC236}">
+                  <a16:creationId xmlns:a16="http://schemas.microsoft.com/office/drawing/2014/main" id="{E0905336-FFB5-40EE-80ED-119C3CAE80D8}"/>
+                </a:ext>
+              </a:extLst>
+            </p:cNvPr>
+            <p:cNvSpPr/>
+            <p:nvPr/>
+          </p:nvSpPr>
+          <p:spPr>
+            <a:xfrm>
+              <a:off x="2768368" y="1843481"/>
+              <a:ext cx="2692866" cy="3171038"/>
+            </a:xfrm>
+            <a:prstGeom prst="rect">
+              <a:avLst/>
+            </a:prstGeom>
+          </p:spPr>
+          <p:style>
+            <a:lnRef idx="2">
+              <a:schemeClr val="accent1">
+                <a:shade val="50000"/>
+              </a:schemeClr>
+            </a:lnRef>
+            <a:fillRef idx="1">
+              <a:schemeClr val="accent1"/>
+            </a:fillRef>
+            <a:effectRef idx="0">
+              <a:schemeClr val="accent1"/>
+            </a:effectRef>
+            <a:fontRef idx="minor">
+              <a:schemeClr val="lt1"/>
+            </a:fontRef>
+          </p:style>
+          <p:txBody>
+            <a:bodyPr rtlCol="0" anchor="ctr"/>
+            <a:lstStyle/>
+            <a:p>
+              <a:pPr algn="ctr"/>
+              <a:r>
+                <a:rPr lang="en-US" dirty="0">
+                  <a:latin typeface="Avenir Next LT Pro" panose="020B0504020202020204" pitchFamily="34" charset="0"/>
+                </a:rPr>
+                <a:t>Sample Size Threshold:</a:t>
+              </a:r>
+            </a:p>
+            <a:p>
+              <a:pPr algn="ctr"/>
+              <a:r>
+                <a:rPr lang="en-US" b="1" dirty="0">
+                  <a:latin typeface="Avenir Next LT Pro" panose="020B0504020202020204" pitchFamily="34" charset="0"/>
+                </a:rPr>
+                <a:t>100</a:t>
+              </a:r>
+            </a:p>
+          </p:txBody>
+        </p:sp>
+        <p:cxnSp>
+          <p:nvCxnSpPr>
+            <p:cNvPr id="6" name="Straight Connector 5">
+              <a:extLst>
+                <a:ext uri="{FF2B5EF4-FFF2-40B4-BE49-F238E27FC236}">
+                  <a16:creationId xmlns:a16="http://schemas.microsoft.com/office/drawing/2014/main" id="{49FBA903-B13F-48CB-A071-585189851AD3}"/>
+                </a:ext>
+              </a:extLst>
+            </p:cNvPr>
+            <p:cNvCxnSpPr>
+              <a:cxnSpLocks/>
+            </p:cNvCxnSpPr>
+            <p:nvPr/>
+          </p:nvCxnSpPr>
+          <p:spPr>
+            <a:xfrm>
+              <a:off x="3191070" y="2472612"/>
+              <a:ext cx="1872000" cy="0"/>
+            </a:xfrm>
+            <a:prstGeom prst="line">
+              <a:avLst/>
+            </a:prstGeom>
+            <a:ln w="25400">
+              <a:solidFill>
+                <a:schemeClr val="bg1"/>
+              </a:solidFill>
+            </a:ln>
+          </p:spPr>
+          <p:style>
+            <a:lnRef idx="1">
+              <a:schemeClr val="accent1"/>
+            </a:lnRef>
+            <a:fillRef idx="0">
+              <a:schemeClr val="accent1"/>
+            </a:fillRef>
+            <a:effectRef idx="0">
+              <a:schemeClr val="accent1"/>
+            </a:effectRef>
+            <a:fontRef idx="minor">
+              <a:schemeClr val="tx1"/>
+            </a:fontRef>
+          </p:style>
+        </p:cxnSp>
+        <p:sp>
+          <p:nvSpPr>
+            <p:cNvPr id="7" name="TextBox 6">
+              <a:extLst>
+                <a:ext uri="{FF2B5EF4-FFF2-40B4-BE49-F238E27FC236}">
+                  <a16:creationId xmlns:a16="http://schemas.microsoft.com/office/drawing/2014/main" id="{F998D7C1-783B-4A27-8BFA-2E71092CF570}"/>
+                </a:ext>
+              </a:extLst>
+            </p:cNvPr>
+            <p:cNvSpPr txBox="1"/>
+            <p:nvPr/>
+          </p:nvSpPr>
+          <p:spPr>
+            <a:xfrm>
+              <a:off x="3277984" y="1973381"/>
+              <a:ext cx="1698171" cy="369332"/>
+            </a:xfrm>
+            <a:prstGeom prst="rect">
+              <a:avLst/>
+            </a:prstGeom>
+            <a:noFill/>
+          </p:spPr>
+          <p:txBody>
+            <a:bodyPr wrap="square" rtlCol="0">
+              <a:spAutoFit/>
+            </a:bodyPr>
+            <a:lstStyle/>
+            <a:p>
+              <a:pPr algn="ctr"/>
+              <a:r>
+                <a:rPr lang="en-US" dirty="0">
+                  <a:solidFill>
+                    <a:schemeClr val="bg1"/>
+                  </a:solidFill>
+                  <a:latin typeface="Avenir LT Std 65 Medium" panose="020B0803020203020204" pitchFamily="34" charset="0"/>
+                </a:rPr>
+                <a:t>Dataset 3</a:t>
+              </a:r>
+            </a:p>
+          </p:txBody>
+        </p:sp>
+      </p:grpSp>
+    </p:spTree>
+    <p:extLst>
+      <p:ext uri="{BB962C8B-B14F-4D97-AF65-F5344CB8AC3E}">
+        <p14:creationId xmlns:p14="http://schemas.microsoft.com/office/powerpoint/2010/main" val="549630934"/>
+      </p:ext>
+    </p:extLst>
+  </p:cSld>
+  <p:clrMapOvr>
+    <a:masterClrMapping/>
+  </p:clrMapOvr>
+</p:sld>
+</file>
+
+<file path=ppt/slides/slide13.xml><?xml version="1.0" encoding="utf-8"?>
+<p:sld xmlns:a="http://schemas.openxmlformats.org/drawingml/2006/main" xmlns:r="http://schemas.openxmlformats.org/officeDocument/2006/relationships" xmlns:p="http://schemas.openxmlformats.org/presentationml/2006/main">
+  <p:cSld>
+    <p:spTree>
+      <p:nvGrpSpPr>
+        <p:cNvPr id="1" name=""/>
+        <p:cNvGrpSpPr/>
+        <p:nvPr/>
+      </p:nvGrpSpPr>
+      <p:grpSpPr>
+        <a:xfrm>
+          <a:off x="0" y="0"/>
+          <a:ext cx="0" cy="0"/>
+          <a:chOff x="0" y="0"/>
+          <a:chExt cx="0" cy="0"/>
+        </a:xfrm>
+      </p:grpSpPr>
+      <p:pic>
+        <p:nvPicPr>
+          <p:cNvPr id="4" name="Picture 3" descr="A picture containing text, sign&#10;&#10;Description automatically generated">
+            <a:extLst>
+              <a:ext uri="{FF2B5EF4-FFF2-40B4-BE49-F238E27FC236}">
+                <a16:creationId xmlns:a16="http://schemas.microsoft.com/office/drawing/2014/main" id="{ACEBB09F-0C81-4242-BE3C-93EDD65E2B27}"/>
+              </a:ext>
+            </a:extLst>
+          </p:cNvPr>
+          <p:cNvPicPr>
+            <a:picLocks noChangeAspect="1"/>
+          </p:cNvPicPr>
+          <p:nvPr/>
+        </p:nvPicPr>
+        <p:blipFill>
+          <a:blip r:embed="rId2">
+            <a:extLst>
+              <a:ext uri="{28A0092B-C50C-407E-A947-70E740481C1C}">
+                <a14:useLocalDpi xmlns:a14="http://schemas.microsoft.com/office/drawing/2010/main" val="0"/>
+              </a:ext>
+            </a:extLst>
+          </a:blip>
+          <a:stretch>
+            <a:fillRect/>
+          </a:stretch>
+        </p:blipFill>
+        <p:spPr>
+          <a:xfrm>
+            <a:off x="392949" y="2288390"/>
+            <a:ext cx="11406102" cy="2281220"/>
+          </a:xfrm>
+          <a:prstGeom prst="rect">
+            <a:avLst/>
+          </a:prstGeom>
+        </p:spPr>
+      </p:pic>
+    </p:spTree>
+    <p:extLst>
+      <p:ext uri="{BB962C8B-B14F-4D97-AF65-F5344CB8AC3E}">
+        <p14:creationId xmlns:p14="http://schemas.microsoft.com/office/powerpoint/2010/main" val="1740227932"/>
+      </p:ext>
+    </p:extLst>
+  </p:cSld>
+  <p:clrMapOvr>
+    <a:masterClrMapping/>
+  </p:clrMapOvr>
+</p:sld>
+</file>
+
+<file path=ppt/slides/slide14.xml><?xml version="1.0" encoding="utf-8"?>
+<p:sld xmlns:a="http://schemas.openxmlformats.org/drawingml/2006/main" xmlns:r="http://schemas.openxmlformats.org/officeDocument/2006/relationships" xmlns:p="http://schemas.openxmlformats.org/presentationml/2006/main">
+  <p:cSld>
+    <p:spTree>
+      <p:nvGrpSpPr>
+        <p:cNvPr id="1" name=""/>
+        <p:cNvGrpSpPr/>
+        <p:nvPr/>
+      </p:nvGrpSpPr>
+      <p:grpSpPr>
+        <a:xfrm>
+          <a:off x="0" y="0"/>
+          <a:ext cx="0" cy="0"/>
+          <a:chOff x="0" y="0"/>
+          <a:chExt cx="0" cy="0"/>
+        </a:xfrm>
+      </p:grpSpPr>
+      <p:sp>
+        <p:nvSpPr>
+          <p:cNvPr id="3" name="Content Placeholder 2">
+            <a:extLst>
+              <a:ext uri="{FF2B5EF4-FFF2-40B4-BE49-F238E27FC236}">
+                <a16:creationId xmlns:a16="http://schemas.microsoft.com/office/drawing/2014/main" id="{38484519-4CCF-41B8-9933-9CA54C757C92}"/>
+              </a:ext>
+            </a:extLst>
+          </p:cNvPr>
+          <p:cNvSpPr>
+            <a:spLocks noGrp="1"/>
+          </p:cNvSpPr>
+          <p:nvPr>
+            <p:ph idx="1"/>
+          </p:nvPr>
+        </p:nvSpPr>
+        <p:spPr>
+          <a:xfrm>
+            <a:off x="838200" y="1825625"/>
+            <a:ext cx="10515600" cy="4351338"/>
+          </a:xfrm>
+        </p:spPr>
+        <p:txBody>
+          <a:bodyPr>
+            <a:normAutofit/>
+          </a:bodyPr>
+          <a:lstStyle/>
+          <a:p>
+            <a:pPr marL="0" indent="0">
+              <a:buNone/>
+            </a:pPr>
+            <a:endParaRPr lang="en-US" sz="2400" dirty="0">
+              <a:latin typeface="Avenir Next LT Pro" panose="020B0504020202020204" pitchFamily="34" charset="0"/>
+              <a:ea typeface="Cambria" panose="02040503050406030204" pitchFamily="18" charset="0"/>
+              <a:cs typeface="Arial" panose="020B0604020202020204" pitchFamily="34" charset="0"/>
+            </a:endParaRPr>
+          </a:p>
+          <a:p>
+            <a:r>
+              <a:rPr lang="en-US" sz="2400" dirty="0">
+                <a:latin typeface="Avenir Next LT Pro" panose="020B0504020202020204" pitchFamily="34" charset="0"/>
+                <a:ea typeface="Cambria" panose="02040503050406030204" pitchFamily="18" charset="0"/>
+                <a:cs typeface="Arial" panose="020B0604020202020204" pitchFamily="34" charset="0"/>
+              </a:rPr>
+              <a:t>Model’s performance with a more complete dataset</a:t>
+            </a:r>
+          </a:p>
+          <a:p>
+            <a:r>
+              <a:rPr lang="en-US" sz="2400" dirty="0">
+                <a:latin typeface="Avenir Next LT Pro" panose="020B0504020202020204" pitchFamily="34" charset="0"/>
+                <a:ea typeface="Cambria" panose="02040503050406030204" pitchFamily="18" charset="0"/>
+                <a:cs typeface="Arial" panose="020B0604020202020204" pitchFamily="34" charset="0"/>
+              </a:rPr>
+              <a:t>Ensemble Models</a:t>
+            </a:r>
+          </a:p>
+          <a:p>
+            <a:endParaRPr lang="en-US" sz="2400" dirty="0">
+              <a:latin typeface="Avenir Next LT Pro" panose="020B0504020202020204" pitchFamily="34" charset="0"/>
+              <a:ea typeface="Cambria" panose="02040503050406030204" pitchFamily="18" charset="0"/>
+              <a:cs typeface="Arial" panose="020B0604020202020204" pitchFamily="34" charset="0"/>
+            </a:endParaRPr>
+          </a:p>
+          <a:p>
+            <a:endParaRPr lang="en-US" sz="2000" dirty="0">
+              <a:latin typeface="Avenir Next LT Pro" panose="020B0504020202020204" pitchFamily="34" charset="0"/>
+              <a:ea typeface="Cambria" panose="02040503050406030204" pitchFamily="18" charset="0"/>
+              <a:cs typeface="Arial" panose="020B0604020202020204" pitchFamily="34" charset="0"/>
+            </a:endParaRPr>
+          </a:p>
+        </p:txBody>
+      </p:sp>
+      <p:sp>
+        <p:nvSpPr>
+          <p:cNvPr id="5" name="Title 1">
+            <a:extLst>
+              <a:ext uri="{FF2B5EF4-FFF2-40B4-BE49-F238E27FC236}">
+                <a16:creationId xmlns:a16="http://schemas.microsoft.com/office/drawing/2014/main" id="{3A1DDE28-9306-46A2-B16A-326F601C17A4}"/>
+              </a:ext>
+            </a:extLst>
+          </p:cNvPr>
+          <p:cNvSpPr>
+            <a:spLocks noGrp="1"/>
+          </p:cNvSpPr>
+          <p:nvPr>
+            <p:ph type="title"/>
+          </p:nvPr>
+        </p:nvSpPr>
+        <p:spPr>
+          <a:xfrm>
+            <a:off x="838200" y="365125"/>
+            <a:ext cx="10515600" cy="1325563"/>
+          </a:xfrm>
+        </p:spPr>
+        <p:txBody>
+          <a:bodyPr/>
+          <a:lstStyle/>
+          <a:p>
+            <a:r>
+              <a:rPr lang="en-US" b="1" dirty="0">
+                <a:latin typeface="Avenir LT Std 65 Medium" panose="020B0803020203020204" pitchFamily="34" charset="0"/>
+              </a:rPr>
+              <a:t>Further Exploration</a:t>
+            </a:r>
+          </a:p>
+        </p:txBody>
+      </p:sp>
+    </p:spTree>
+    <p:extLst>
+      <p:ext uri="{BB962C8B-B14F-4D97-AF65-F5344CB8AC3E}">
+        <p14:creationId xmlns:p14="http://schemas.microsoft.com/office/powerpoint/2010/main" val="3958911511"/>
+      </p:ext>
+    </p:extLst>
+  </p:cSld>
+  <p:clrMapOvr>
+    <a:masterClrMapping/>
+  </p:clrMapOvr>
+</p:sld>
+</file>
+
 <file path=ppt/slides/slide2.xml><?xml version="1.0" encoding="utf-8"?>
 <p:sld xmlns:a="http://schemas.openxmlformats.org/drawingml/2006/main" xmlns:r="http://schemas.openxmlformats.org/officeDocument/2006/relationships" xmlns:p="http://schemas.openxmlformats.org/presentationml/2006/main">
   <p:cSld>
@@ -3432,6 +4334,60 @@
       </p:grpSpPr>
       <p:sp>
         <p:nvSpPr>
+          <p:cNvPr id="4" name="Rectangle 3">
+            <a:extLst>
+              <a:ext uri="{FF2B5EF4-FFF2-40B4-BE49-F238E27FC236}">
+                <a16:creationId xmlns:a16="http://schemas.microsoft.com/office/drawing/2014/main" id="{08CEC998-32FD-4ABA-927A-DA7A93FE1028}"/>
+              </a:ext>
+            </a:extLst>
+          </p:cNvPr>
+          <p:cNvSpPr/>
+          <p:nvPr/>
+        </p:nvSpPr>
+        <p:spPr>
+          <a:xfrm>
+            <a:off x="7526628" y="69979"/>
+            <a:ext cx="3882226" cy="6718041"/>
+          </a:xfrm>
+          <a:prstGeom prst="rect">
+            <a:avLst/>
+          </a:prstGeom>
+          <a:noFill/>
+          <a:effectLst>
+            <a:outerShdw blurRad="50800" dist="38100" dir="5400000" algn="t" rotWithShape="0">
+              <a:schemeClr val="bg1">
+                <a:alpha val="40000"/>
+              </a:schemeClr>
+            </a:outerShdw>
+          </a:effectLst>
+        </p:spPr>
+        <p:style>
+          <a:lnRef idx="2">
+            <a:schemeClr val="accent1">
+              <a:shade val="50000"/>
+            </a:schemeClr>
+          </a:lnRef>
+          <a:fillRef idx="1">
+            <a:schemeClr val="accent1"/>
+          </a:fillRef>
+          <a:effectRef idx="0">
+            <a:schemeClr val="accent1"/>
+          </a:effectRef>
+          <a:fontRef idx="minor">
+            <a:schemeClr val="lt1"/>
+          </a:fontRef>
+        </p:style>
+        <p:txBody>
+          <a:bodyPr rtlCol="0" anchor="ctr"/>
+          <a:lstStyle/>
+          <a:p>
+            <a:pPr algn="ctr"/>
+            <a:endParaRPr lang="en-US"/>
+          </a:p>
+        </p:txBody>
+      </p:sp>
+      <p:sp>
+        <p:nvSpPr>
           <p:cNvPr id="2" name="Title 1">
             <a:extLst>
               <a:ext uri="{FF2B5EF4-FFF2-40B4-BE49-F238E27FC236}">
@@ -3452,11 +4408,14 @@
           <a:lstStyle/>
           <a:p>
             <a:r>
-              <a:rPr lang="en-US" dirty="0">
-                <a:latin typeface="Century Gothic" panose="020B0502020202020204" pitchFamily="34" charset="0"/>
+              <a:rPr lang="en-US" b="1">
+                <a:latin typeface="Avenir LT Std 65 Medium" panose="020B0803020203020204" pitchFamily="34" charset="0"/>
               </a:rPr>
               <a:t>The Dataset</a:t>
             </a:r>
+            <a:endParaRPr lang="en-US" b="1" dirty="0">
+              <a:latin typeface="Avenir LT Std 65 Medium" panose="020B0803020203020204" pitchFamily="34" charset="0"/>
+            </a:endParaRPr>
           </a:p>
         </p:txBody>
       </p:sp>
@@ -3478,22 +4437,24 @@
         </p:nvSpPr>
         <p:spPr/>
         <p:txBody>
-          <a:bodyPr/>
+          <a:bodyPr>
+            <a:normAutofit/>
+          </a:bodyPr>
           <a:lstStyle/>
           <a:p>
             <a:pPr marL="0" indent="0">
               <a:buNone/>
             </a:pPr>
-            <a:endParaRPr lang="en-US" dirty="0">
-              <a:latin typeface="Arial" panose="020B0604020202020204" pitchFamily="34" charset="0"/>
+            <a:endParaRPr lang="en-US" sz="2400">
+              <a:latin typeface="Avenir Next LT Pro" panose="020B0504020202020204" pitchFamily="34" charset="0"/>
               <a:ea typeface="Cambria" panose="02040503050406030204" pitchFamily="18" charset="0"/>
               <a:cs typeface="Arial" panose="020B0604020202020204" pitchFamily="34" charset="0"/>
             </a:endParaRPr>
           </a:p>
           <a:p>
             <a:r>
-              <a:rPr lang="en-US" dirty="0">
-                <a:latin typeface="Arial" panose="020B0604020202020204" pitchFamily="34" charset="0"/>
+              <a:rPr lang="en-US" sz="2400">
+                <a:latin typeface="Avenir Next LT Pro" panose="020B0504020202020204" pitchFamily="34" charset="0"/>
                 <a:ea typeface="Cambria" panose="02040503050406030204" pitchFamily="18" charset="0"/>
                 <a:cs typeface="Arial" panose="020B0604020202020204" pitchFamily="34" charset="0"/>
                 <a:hlinkClick r:id="rId2"/>
@@ -3504,50 +4465,34 @@
           <a:p>
             <a:pPr lvl="1"/>
             <a:r>
-              <a:rPr lang="en-US" dirty="0">
-                <a:latin typeface="Arial" panose="020B0604020202020204" pitchFamily="34" charset="0"/>
+              <a:rPr lang="en-US" sz="2000">
+                <a:latin typeface="Avenir Next LT Pro" panose="020B0504020202020204" pitchFamily="34" charset="0"/>
                 <a:ea typeface="Cambria" panose="02040503050406030204" pitchFamily="18" charset="0"/>
                 <a:cs typeface="Arial" panose="020B0604020202020204" pitchFamily="34" charset="0"/>
                 <a:hlinkClick r:id="rId2"/>
               </a:rPr>
               <a:t>National Laboratory of Pattern Recognition</a:t>
             </a:r>
-            <a:endParaRPr lang="en-US" dirty="0">
-              <a:latin typeface="Arial" panose="020B0604020202020204" pitchFamily="34" charset="0"/>
+            <a:endParaRPr lang="en-US" sz="2000">
+              <a:latin typeface="Avenir Next LT Pro" panose="020B0504020202020204" pitchFamily="34" charset="0"/>
               <a:ea typeface="Cambria" panose="02040503050406030204" pitchFamily="18" charset="0"/>
               <a:cs typeface="Arial" panose="020B0604020202020204" pitchFamily="34" charset="0"/>
             </a:endParaRPr>
           </a:p>
           <a:p>
             <a:r>
-              <a:rPr lang="en-US" dirty="0">
-                <a:latin typeface="Arial" panose="020B0604020202020204" pitchFamily="34" charset="0"/>
+              <a:rPr lang="en-US" sz="2400">
+                <a:latin typeface="Avenir Next LT Pro" panose="020B0504020202020204" pitchFamily="34" charset="0"/>
                 <a:ea typeface="Cambria" panose="02040503050406030204" pitchFamily="18" charset="0"/>
                 <a:cs typeface="Arial" panose="020B0604020202020204" pitchFamily="34" charset="0"/>
               </a:rPr>
-              <a:t>Total Images: 6164 .</a:t>
-            </a:r>
-            <a:r>
-              <a:rPr lang="en-US" dirty="0" err="1">
-                <a:latin typeface="Arial" panose="020B0604020202020204" pitchFamily="34" charset="0"/>
-                <a:ea typeface="Cambria" panose="02040503050406030204" pitchFamily="18" charset="0"/>
-                <a:cs typeface="Arial" panose="020B0604020202020204" pitchFamily="34" charset="0"/>
-              </a:rPr>
-              <a:t>png</a:t>
-            </a:r>
-            <a:r>
-              <a:rPr lang="en-US" dirty="0">
-                <a:latin typeface="Arial" panose="020B0604020202020204" pitchFamily="34" charset="0"/>
-                <a:ea typeface="Cambria" panose="02040503050406030204" pitchFamily="18" charset="0"/>
-                <a:cs typeface="Arial" panose="020B0604020202020204" pitchFamily="34" charset="0"/>
-              </a:rPr>
-              <a:t> files</a:t>
-            </a:r>
-          </a:p>
-          <a:p>
-            <a:r>
-              <a:rPr lang="en-US" dirty="0">
-                <a:latin typeface="Arial" panose="020B0604020202020204" pitchFamily="34" charset="0"/>
+              <a:t>Total Images: 6164 .png files</a:t>
+            </a:r>
+          </a:p>
+          <a:p>
+            <a:r>
+              <a:rPr lang="en-US" sz="2400">
+                <a:latin typeface="Avenir Next LT Pro" panose="020B0504020202020204" pitchFamily="34" charset="0"/>
                 <a:ea typeface="Cambria" panose="02040503050406030204" pitchFamily="18" charset="0"/>
                 <a:cs typeface="Arial" panose="020B0604020202020204" pitchFamily="34" charset="0"/>
               </a:rPr>
@@ -3556,8 +4501,8 @@
           </a:p>
           <a:p>
             <a:r>
-              <a:rPr lang="en-US" dirty="0">
-                <a:latin typeface="Arial" panose="020B0604020202020204" pitchFamily="34" charset="0"/>
+              <a:rPr lang="en-US" sz="2400">
+                <a:latin typeface="Avenir Next LT Pro" panose="020B0504020202020204" pitchFamily="34" charset="0"/>
                 <a:ea typeface="Cambria" panose="02040503050406030204" pitchFamily="18" charset="0"/>
                 <a:cs typeface="Arial" panose="020B0604020202020204" pitchFamily="34" charset="0"/>
               </a:rPr>
@@ -3566,27 +4511,19 @@
           </a:p>
           <a:p>
             <a:r>
-              <a:rPr lang="en-US" dirty="0" err="1">
-                <a:latin typeface="Arial" panose="020B0604020202020204" pitchFamily="34" charset="0"/>
+              <a:rPr lang="en-US" sz="2400">
+                <a:latin typeface="Avenir Next LT Pro" panose="020B0504020202020204" pitchFamily="34" charset="0"/>
                 <a:ea typeface="Cambria" panose="02040503050406030204" pitchFamily="18" charset="0"/>
                 <a:cs typeface="Arial" panose="020B0604020202020204" pitchFamily="34" charset="0"/>
               </a:rPr>
-              <a:t>Misc</a:t>
-            </a:r>
-            <a:r>
-              <a:rPr lang="en-US" dirty="0">
-                <a:latin typeface="Arial" panose="020B0604020202020204" pitchFamily="34" charset="0"/>
-                <a:ea typeface="Cambria" panose="02040503050406030204" pitchFamily="18" charset="0"/>
-                <a:cs typeface="Arial" panose="020B0604020202020204" pitchFamily="34" charset="0"/>
-              </a:rPr>
-              <a:t>:</a:t>
+              <a:t>Images:</a:t>
             </a:r>
           </a:p>
           <a:p>
             <a:pPr lvl="1"/>
             <a:r>
-              <a:rPr lang="en-US" dirty="0">
-                <a:latin typeface="Arial" panose="020B0604020202020204" pitchFamily="34" charset="0"/>
+              <a:rPr lang="en-US" sz="2000">
+                <a:latin typeface="Avenir Next LT Pro" panose="020B0504020202020204" pitchFamily="34" charset="0"/>
                 <a:ea typeface="Cambria" panose="02040503050406030204" pitchFamily="18" charset="0"/>
                 <a:cs typeface="Arial" panose="020B0604020202020204" pitchFamily="34" charset="0"/>
               </a:rPr>
@@ -3596,13 +4533,18 @@
           <a:p>
             <a:pPr lvl="1"/>
             <a:r>
-              <a:rPr lang="en-US" dirty="0">
-                <a:latin typeface="Arial" panose="020B0604020202020204" pitchFamily="34" charset="0"/>
+              <a:rPr lang="en-US" sz="2000">
+                <a:latin typeface="Avenir Next LT Pro" panose="020B0504020202020204" pitchFamily="34" charset="0"/>
                 <a:ea typeface="Cambria" panose="02040503050406030204" pitchFamily="18" charset="0"/>
                 <a:cs typeface="Arial" panose="020B0604020202020204" pitchFamily="34" charset="0"/>
               </a:rPr>
               <a:t>Various sizes and resolutions</a:t>
             </a:r>
+            <a:endParaRPr lang="en-US" sz="2000" dirty="0">
+              <a:latin typeface="Avenir Next LT Pro" panose="020B0504020202020204" pitchFamily="34" charset="0"/>
+              <a:ea typeface="Cambria" panose="02040503050406030204" pitchFamily="18" charset="0"/>
+              <a:cs typeface="Arial" panose="020B0604020202020204" pitchFamily="34" charset="0"/>
+            </a:endParaRPr>
           </a:p>
         </p:txBody>
       </p:sp>
@@ -3634,7 +4576,7 @@
         </p:blipFill>
         <p:spPr>
           <a:xfrm>
-            <a:off x="8156262" y="231462"/>
+            <a:off x="7868972" y="231462"/>
             <a:ext cx="3197538" cy="6395076"/>
           </a:xfrm>
           <a:prstGeom prst="rect">
@@ -3674,10 +4616,10 @@
       </p:grpSpPr>
       <p:pic>
         <p:nvPicPr>
-          <p:cNvPr id="10" name="Picture 9" descr="A picture containing timeline&#10;&#10;Description automatically generated">
-            <a:extLst>
-              <a:ext uri="{FF2B5EF4-FFF2-40B4-BE49-F238E27FC236}">
-                <a16:creationId xmlns:a16="http://schemas.microsoft.com/office/drawing/2014/main" id="{4DB7A9B8-5AE0-4325-84D0-58E1FC935A95}"/>
+          <p:cNvPr id="3" name="Picture 2" descr="Graphical user interface, application&#10;&#10;Description automatically generated">
+            <a:extLst>
+              <a:ext uri="{FF2B5EF4-FFF2-40B4-BE49-F238E27FC236}">
+                <a16:creationId xmlns:a16="http://schemas.microsoft.com/office/drawing/2014/main" id="{6DF6F3BC-7450-42FD-B3D4-9A0081F7F572}"/>
               </a:ext>
             </a:extLst>
           </p:cNvPr>
@@ -3700,8 +4642,8 @@
         </p:blipFill>
         <p:spPr>
           <a:xfrm>
-            <a:off x="0" y="1397000"/>
-            <a:ext cx="12192000" cy="4064000"/>
+            <a:off x="2262845" y="873563"/>
+            <a:ext cx="7666310" cy="5110874"/>
           </a:xfrm>
           <a:prstGeom prst="rect">
             <a:avLst/>
@@ -3740,6 +4682,72 @@
       </p:grpSpPr>
       <p:pic>
         <p:nvPicPr>
+          <p:cNvPr id="10" name="Picture 9" descr="A picture containing timeline&#10;&#10;Description automatically generated">
+            <a:extLst>
+              <a:ext uri="{FF2B5EF4-FFF2-40B4-BE49-F238E27FC236}">
+                <a16:creationId xmlns:a16="http://schemas.microsoft.com/office/drawing/2014/main" id="{4DB7A9B8-5AE0-4325-84D0-58E1FC935A95}"/>
+              </a:ext>
+            </a:extLst>
+          </p:cNvPr>
+          <p:cNvPicPr>
+            <a:picLocks noChangeAspect="1"/>
+          </p:cNvPicPr>
+          <p:nvPr/>
+        </p:nvPicPr>
+        <p:blipFill>
+          <a:blip r:embed="rId2">
+            <a:extLst>
+              <a:ext uri="{28A0092B-C50C-407E-A947-70E740481C1C}">
+                <a14:useLocalDpi xmlns:a14="http://schemas.microsoft.com/office/drawing/2010/main" val="0"/>
+              </a:ext>
+            </a:extLst>
+          </a:blip>
+          <a:stretch>
+            <a:fillRect/>
+          </a:stretch>
+        </p:blipFill>
+        <p:spPr>
+          <a:xfrm>
+            <a:off x="0" y="1397000"/>
+            <a:ext cx="12192000" cy="4064000"/>
+          </a:xfrm>
+          <a:prstGeom prst="rect">
+            <a:avLst/>
+          </a:prstGeom>
+        </p:spPr>
+      </p:pic>
+    </p:spTree>
+    <p:extLst>
+      <p:ext uri="{BB962C8B-B14F-4D97-AF65-F5344CB8AC3E}">
+        <p14:creationId xmlns:p14="http://schemas.microsoft.com/office/powerpoint/2010/main" val="1354320824"/>
+      </p:ext>
+    </p:extLst>
+  </p:cSld>
+  <p:clrMapOvr>
+    <a:masterClrMapping/>
+  </p:clrMapOvr>
+</p:sld>
+</file>
+
+<file path=ppt/slides/slide5.xml><?xml version="1.0" encoding="utf-8"?>
+<p:sld xmlns:a="http://schemas.openxmlformats.org/drawingml/2006/main" xmlns:r="http://schemas.openxmlformats.org/officeDocument/2006/relationships" xmlns:p="http://schemas.openxmlformats.org/presentationml/2006/main">
+  <p:cSld>
+    <p:spTree>
+      <p:nvGrpSpPr>
+        <p:cNvPr id="1" name=""/>
+        <p:cNvGrpSpPr/>
+        <p:nvPr/>
+      </p:nvGrpSpPr>
+      <p:grpSpPr>
+        <a:xfrm>
+          <a:off x="0" y="0"/>
+          <a:ext cx="0" cy="0"/>
+          <a:chOff x="0" y="0"/>
+          <a:chExt cx="0" cy="0"/>
+        </a:xfrm>
+      </p:grpSpPr>
+      <p:pic>
+        <p:nvPicPr>
           <p:cNvPr id="3" name="Picture 2" descr="Chart, funnel chart&#10;&#10;Description automatically generated">
             <a:extLst>
               <a:ext uri="{FF2B5EF4-FFF2-40B4-BE49-F238E27FC236}">
@@ -3787,9 +4795,17 @@
 </p:sld>
 </file>
 
-<file path=ppt/slides/slide5.xml><?xml version="1.0" encoding="utf-8"?>
+<file path=ppt/slides/slide6.xml><?xml version="1.0" encoding="utf-8"?>
 <p:sld xmlns:a="http://schemas.openxmlformats.org/drawingml/2006/main" xmlns:r="http://schemas.openxmlformats.org/officeDocument/2006/relationships" xmlns:p="http://schemas.openxmlformats.org/presentationml/2006/main">
   <p:cSld>
+    <p:bg>
+      <p:bgPr>
+        <a:solidFill>
+          <a:schemeClr val="bg1"/>
+        </a:solidFill>
+        <a:effectLst/>
+      </p:bgPr>
+    </p:bg>
     <p:spTree>
       <p:nvGrpSpPr>
         <p:cNvPr id="1" name=""/>
@@ -3804,112 +4820,500 @@
           <a:chExt cx="0" cy="0"/>
         </a:xfrm>
       </p:grpSpPr>
-      <p:pic>
-        <p:nvPicPr>
-          <p:cNvPr id="4" name="Picture 3" descr="Chart, bar chart&#10;&#10;Description automatically generated">
-            <a:extLst>
-              <a:ext uri="{FF2B5EF4-FFF2-40B4-BE49-F238E27FC236}">
-                <a16:creationId xmlns:a16="http://schemas.microsoft.com/office/drawing/2014/main" id="{226DE022-67C9-4E31-AAF5-FF2165B7E05E}"/>
-              </a:ext>
-            </a:extLst>
-          </p:cNvPr>
-          <p:cNvPicPr>
-            <a:picLocks noChangeAspect="1"/>
-          </p:cNvPicPr>
+      <p:grpSp>
+        <p:nvGrpSpPr>
+          <p:cNvPr id="10" name="Group 9">
+            <a:extLst>
+              <a:ext uri="{FF2B5EF4-FFF2-40B4-BE49-F238E27FC236}">
+                <a16:creationId xmlns:a16="http://schemas.microsoft.com/office/drawing/2014/main" id="{D80EEFC7-8DF5-4985-B85B-E79953388944}"/>
+              </a:ext>
+            </a:extLst>
+          </p:cNvPr>
+          <p:cNvGrpSpPr/>
           <p:nvPr/>
-        </p:nvPicPr>
-        <p:blipFill>
-          <a:blip r:embed="rId2">
-            <a:extLst>
-              <a:ext uri="{28A0092B-C50C-407E-A947-70E740481C1C}">
-                <a14:useLocalDpi xmlns:a14="http://schemas.microsoft.com/office/drawing/2010/main" val="0"/>
-              </a:ext>
-            </a:extLst>
-          </a:blip>
-          <a:stretch>
-            <a:fillRect/>
-          </a:stretch>
-        </p:blipFill>
-        <p:spPr>
+        </p:nvGrpSpPr>
+        <p:grpSpPr>
           <a:xfrm>
-            <a:off x="2292033" y="893022"/>
-            <a:ext cx="7607934" cy="5071956"/>
+            <a:off x="1421935" y="1843481"/>
+            <a:ext cx="2692866" cy="3171038"/>
+            <a:chOff x="2768368" y="1843481"/>
+            <a:chExt cx="2692866" cy="3171038"/>
           </a:xfrm>
-          <a:prstGeom prst="rect">
-            <a:avLst/>
-          </a:prstGeom>
-        </p:spPr>
-      </p:pic>
+        </p:grpSpPr>
+        <p:sp>
+          <p:nvSpPr>
+            <p:cNvPr id="2" name="Rectangle 1">
+              <a:extLst>
+                <a:ext uri="{FF2B5EF4-FFF2-40B4-BE49-F238E27FC236}">
+                  <a16:creationId xmlns:a16="http://schemas.microsoft.com/office/drawing/2014/main" id="{6A638087-A2B9-49A7-99E0-8C3F3B390FC7}"/>
+                </a:ext>
+              </a:extLst>
+            </p:cNvPr>
+            <p:cNvSpPr/>
+            <p:nvPr/>
+          </p:nvSpPr>
+          <p:spPr>
+            <a:xfrm>
+              <a:off x="2768368" y="1843481"/>
+              <a:ext cx="2692866" cy="3171038"/>
+            </a:xfrm>
+            <a:prstGeom prst="rect">
+              <a:avLst/>
+            </a:prstGeom>
+            <a:ln w="12700" cmpd="sng">
+              <a:round/>
+            </a:ln>
+            <a:effectLst/>
+          </p:spPr>
+          <p:style>
+            <a:lnRef idx="2">
+              <a:schemeClr val="accent1">
+                <a:shade val="50000"/>
+              </a:schemeClr>
+            </a:lnRef>
+            <a:fillRef idx="1">
+              <a:schemeClr val="accent1"/>
+            </a:fillRef>
+            <a:effectRef idx="0">
+              <a:schemeClr val="accent1"/>
+            </a:effectRef>
+            <a:fontRef idx="minor">
+              <a:schemeClr val="lt1"/>
+            </a:fontRef>
+          </p:style>
+          <p:txBody>
+            <a:bodyPr rtlCol="0" anchor="ctr"/>
+            <a:lstStyle/>
+            <a:p>
+              <a:pPr algn="ctr"/>
+              <a:r>
+                <a:rPr lang="en-US" dirty="0">
+                  <a:latin typeface="Avenir Next LT Pro" panose="020B0504020202020204" pitchFamily="34" charset="0"/>
+                </a:rPr>
+                <a:t>No Filter</a:t>
+              </a:r>
+            </a:p>
+          </p:txBody>
+        </p:sp>
+        <p:cxnSp>
+          <p:nvCxnSpPr>
+            <p:cNvPr id="7" name="Straight Connector 6">
+              <a:extLst>
+                <a:ext uri="{FF2B5EF4-FFF2-40B4-BE49-F238E27FC236}">
+                  <a16:creationId xmlns:a16="http://schemas.microsoft.com/office/drawing/2014/main" id="{98250FAD-2BFD-4D03-B812-7740FF06CEE9}"/>
+                </a:ext>
+              </a:extLst>
+            </p:cNvPr>
+            <p:cNvCxnSpPr>
+              <a:cxnSpLocks/>
+            </p:cNvCxnSpPr>
+            <p:nvPr/>
+          </p:nvCxnSpPr>
+          <p:spPr>
+            <a:xfrm>
+              <a:off x="3191070" y="2472612"/>
+              <a:ext cx="1872000" cy="0"/>
+            </a:xfrm>
+            <a:prstGeom prst="line">
+              <a:avLst/>
+            </a:prstGeom>
+            <a:ln w="25400">
+              <a:solidFill>
+                <a:schemeClr val="bg1"/>
+              </a:solidFill>
+            </a:ln>
+          </p:spPr>
+          <p:style>
+            <a:lnRef idx="1">
+              <a:schemeClr val="accent1"/>
+            </a:lnRef>
+            <a:fillRef idx="0">
+              <a:schemeClr val="accent1"/>
+            </a:fillRef>
+            <a:effectRef idx="0">
+              <a:schemeClr val="accent1"/>
+            </a:effectRef>
+            <a:fontRef idx="minor">
+              <a:schemeClr val="tx1"/>
+            </a:fontRef>
+          </p:style>
+        </p:cxnSp>
+        <p:sp>
+          <p:nvSpPr>
+            <p:cNvPr id="9" name="TextBox 8">
+              <a:extLst>
+                <a:ext uri="{FF2B5EF4-FFF2-40B4-BE49-F238E27FC236}">
+                  <a16:creationId xmlns:a16="http://schemas.microsoft.com/office/drawing/2014/main" id="{D41805C2-4A87-4C57-B044-907D20AACA5F}"/>
+                </a:ext>
+              </a:extLst>
+            </p:cNvPr>
+            <p:cNvSpPr txBox="1"/>
+            <p:nvPr/>
+          </p:nvSpPr>
+          <p:spPr>
+            <a:xfrm>
+              <a:off x="3277984" y="1973381"/>
+              <a:ext cx="1698171" cy="369332"/>
+            </a:xfrm>
+            <a:prstGeom prst="rect">
+              <a:avLst/>
+            </a:prstGeom>
+            <a:noFill/>
+          </p:spPr>
+          <p:txBody>
+            <a:bodyPr wrap="square" rtlCol="0">
+              <a:spAutoFit/>
+            </a:bodyPr>
+            <a:lstStyle/>
+            <a:p>
+              <a:pPr algn="ctr"/>
+              <a:r>
+                <a:rPr lang="en-US" dirty="0">
+                  <a:solidFill>
+                    <a:schemeClr val="bg1"/>
+                  </a:solidFill>
+                  <a:latin typeface="Avenir LT Std 65 Medium" panose="020B0803020203020204" pitchFamily="34" charset="0"/>
+                </a:rPr>
+                <a:t>Dataset 1</a:t>
+              </a:r>
+            </a:p>
+          </p:txBody>
+        </p:sp>
+      </p:grpSp>
+      <p:grpSp>
+        <p:nvGrpSpPr>
+          <p:cNvPr id="11" name="Group 10">
+            <a:extLst>
+              <a:ext uri="{FF2B5EF4-FFF2-40B4-BE49-F238E27FC236}">
+                <a16:creationId xmlns:a16="http://schemas.microsoft.com/office/drawing/2014/main" id="{904EE53A-B0C2-4278-9CE4-D27EB120893E}"/>
+              </a:ext>
+            </a:extLst>
+          </p:cNvPr>
+          <p:cNvGrpSpPr/>
+          <p:nvPr/>
+        </p:nvGrpSpPr>
+        <p:grpSpPr>
+          <a:xfrm>
+            <a:off x="4749567" y="1843481"/>
+            <a:ext cx="2692866" cy="3171038"/>
+            <a:chOff x="2768368" y="1843481"/>
+            <a:chExt cx="2692866" cy="3171038"/>
+          </a:xfrm>
+        </p:grpSpPr>
+        <p:sp>
+          <p:nvSpPr>
+            <p:cNvPr id="12" name="Rectangle 11">
+              <a:extLst>
+                <a:ext uri="{FF2B5EF4-FFF2-40B4-BE49-F238E27FC236}">
+                  <a16:creationId xmlns:a16="http://schemas.microsoft.com/office/drawing/2014/main" id="{ADABDF20-1272-4447-87C3-C13B5908462C}"/>
+                </a:ext>
+              </a:extLst>
+            </p:cNvPr>
+            <p:cNvSpPr/>
+            <p:nvPr/>
+          </p:nvSpPr>
+          <p:spPr>
+            <a:xfrm>
+              <a:off x="2768368" y="1843481"/>
+              <a:ext cx="2692866" cy="3171038"/>
+            </a:xfrm>
+            <a:prstGeom prst="rect">
+              <a:avLst/>
+            </a:prstGeom>
+          </p:spPr>
+          <p:style>
+            <a:lnRef idx="2">
+              <a:schemeClr val="accent1">
+                <a:shade val="50000"/>
+              </a:schemeClr>
+            </a:lnRef>
+            <a:fillRef idx="1">
+              <a:schemeClr val="accent1"/>
+            </a:fillRef>
+            <a:effectRef idx="0">
+              <a:schemeClr val="accent1"/>
+            </a:effectRef>
+            <a:fontRef idx="minor">
+              <a:schemeClr val="lt1"/>
+            </a:fontRef>
+          </p:style>
+          <p:txBody>
+            <a:bodyPr rtlCol="0" anchor="ctr"/>
+            <a:lstStyle/>
+            <a:p>
+              <a:pPr algn="ctr"/>
+              <a:r>
+                <a:rPr lang="en-US" dirty="0">
+                  <a:latin typeface="Avenir Next LT Pro" panose="020B0504020202020204" pitchFamily="34" charset="0"/>
+                </a:rPr>
+                <a:t>Sample Size Threshold:</a:t>
+              </a:r>
+            </a:p>
+            <a:p>
+              <a:pPr algn="ctr"/>
+              <a:r>
+                <a:rPr lang="en-US" b="1" dirty="0">
+                  <a:latin typeface="Avenir Next LT Pro" panose="020B0504020202020204" pitchFamily="34" charset="0"/>
+                </a:rPr>
+                <a:t>50</a:t>
+              </a:r>
+            </a:p>
+          </p:txBody>
+        </p:sp>
+        <p:cxnSp>
+          <p:nvCxnSpPr>
+            <p:cNvPr id="13" name="Straight Connector 12">
+              <a:extLst>
+                <a:ext uri="{FF2B5EF4-FFF2-40B4-BE49-F238E27FC236}">
+                  <a16:creationId xmlns:a16="http://schemas.microsoft.com/office/drawing/2014/main" id="{06070286-D7BD-4654-9312-2C950176A38D}"/>
+                </a:ext>
+              </a:extLst>
+            </p:cNvPr>
+            <p:cNvCxnSpPr>
+              <a:cxnSpLocks/>
+            </p:cNvCxnSpPr>
+            <p:nvPr/>
+          </p:nvCxnSpPr>
+          <p:spPr>
+            <a:xfrm>
+              <a:off x="3191070" y="2472612"/>
+              <a:ext cx="1872000" cy="0"/>
+            </a:xfrm>
+            <a:prstGeom prst="line">
+              <a:avLst/>
+            </a:prstGeom>
+            <a:ln w="25400">
+              <a:solidFill>
+                <a:schemeClr val="bg1"/>
+              </a:solidFill>
+            </a:ln>
+          </p:spPr>
+          <p:style>
+            <a:lnRef idx="1">
+              <a:schemeClr val="accent1"/>
+            </a:lnRef>
+            <a:fillRef idx="0">
+              <a:schemeClr val="accent1"/>
+            </a:fillRef>
+            <a:effectRef idx="0">
+              <a:schemeClr val="accent1"/>
+            </a:effectRef>
+            <a:fontRef idx="minor">
+              <a:schemeClr val="tx1"/>
+            </a:fontRef>
+          </p:style>
+        </p:cxnSp>
+        <p:sp>
+          <p:nvSpPr>
+            <p:cNvPr id="14" name="TextBox 13">
+              <a:extLst>
+                <a:ext uri="{FF2B5EF4-FFF2-40B4-BE49-F238E27FC236}">
+                  <a16:creationId xmlns:a16="http://schemas.microsoft.com/office/drawing/2014/main" id="{D98777E1-FECD-4395-AF43-9B9657E1795E}"/>
+                </a:ext>
+              </a:extLst>
+            </p:cNvPr>
+            <p:cNvSpPr txBox="1"/>
+            <p:nvPr/>
+          </p:nvSpPr>
+          <p:spPr>
+            <a:xfrm>
+              <a:off x="3277984" y="1973381"/>
+              <a:ext cx="1698171" cy="369332"/>
+            </a:xfrm>
+            <a:prstGeom prst="rect">
+              <a:avLst/>
+            </a:prstGeom>
+            <a:noFill/>
+          </p:spPr>
+          <p:txBody>
+            <a:bodyPr wrap="square" rtlCol="0">
+              <a:spAutoFit/>
+            </a:bodyPr>
+            <a:lstStyle/>
+            <a:p>
+              <a:pPr algn="ctr"/>
+              <a:r>
+                <a:rPr lang="en-US" dirty="0">
+                  <a:solidFill>
+                    <a:schemeClr val="bg1"/>
+                  </a:solidFill>
+                  <a:latin typeface="Avenir LT Std 65 Medium" panose="020B0803020203020204" pitchFamily="34" charset="0"/>
+                </a:rPr>
+                <a:t>Dataset 2</a:t>
+              </a:r>
+            </a:p>
+          </p:txBody>
+        </p:sp>
+      </p:grpSp>
+      <p:grpSp>
+        <p:nvGrpSpPr>
+          <p:cNvPr id="15" name="Group 14">
+            <a:extLst>
+              <a:ext uri="{FF2B5EF4-FFF2-40B4-BE49-F238E27FC236}">
+                <a16:creationId xmlns:a16="http://schemas.microsoft.com/office/drawing/2014/main" id="{2BB756A8-CFB1-40C4-9207-0D2A28D7D9AD}"/>
+              </a:ext>
+            </a:extLst>
+          </p:cNvPr>
+          <p:cNvGrpSpPr/>
+          <p:nvPr/>
+        </p:nvGrpSpPr>
+        <p:grpSpPr>
+          <a:xfrm>
+            <a:off x="8077199" y="1843481"/>
+            <a:ext cx="2692866" cy="3171038"/>
+            <a:chOff x="2768368" y="1843481"/>
+            <a:chExt cx="2692866" cy="3171038"/>
+          </a:xfrm>
+        </p:grpSpPr>
+        <p:sp>
+          <p:nvSpPr>
+            <p:cNvPr id="16" name="Rectangle 15">
+              <a:extLst>
+                <a:ext uri="{FF2B5EF4-FFF2-40B4-BE49-F238E27FC236}">
+                  <a16:creationId xmlns:a16="http://schemas.microsoft.com/office/drawing/2014/main" id="{4262701A-9DEF-4B71-825E-11D884981116}"/>
+                </a:ext>
+              </a:extLst>
+            </p:cNvPr>
+            <p:cNvSpPr/>
+            <p:nvPr/>
+          </p:nvSpPr>
+          <p:spPr>
+            <a:xfrm>
+              <a:off x="2768368" y="1843481"/>
+              <a:ext cx="2692866" cy="3171038"/>
+            </a:xfrm>
+            <a:prstGeom prst="rect">
+              <a:avLst/>
+            </a:prstGeom>
+          </p:spPr>
+          <p:style>
+            <a:lnRef idx="2">
+              <a:schemeClr val="accent1">
+                <a:shade val="50000"/>
+              </a:schemeClr>
+            </a:lnRef>
+            <a:fillRef idx="1">
+              <a:schemeClr val="accent1"/>
+            </a:fillRef>
+            <a:effectRef idx="0">
+              <a:schemeClr val="accent1"/>
+            </a:effectRef>
+            <a:fontRef idx="minor">
+              <a:schemeClr val="lt1"/>
+            </a:fontRef>
+          </p:style>
+          <p:txBody>
+            <a:bodyPr rtlCol="0" anchor="ctr"/>
+            <a:lstStyle/>
+            <a:p>
+              <a:pPr algn="ctr"/>
+              <a:r>
+                <a:rPr lang="en-US" dirty="0">
+                  <a:latin typeface="Avenir Next LT Pro" panose="020B0504020202020204" pitchFamily="34" charset="0"/>
+                </a:rPr>
+                <a:t>Sample Size Threshold:</a:t>
+              </a:r>
+            </a:p>
+            <a:p>
+              <a:pPr algn="ctr"/>
+              <a:r>
+                <a:rPr lang="en-US" b="1" dirty="0">
+                  <a:latin typeface="Avenir Next LT Pro" panose="020B0504020202020204" pitchFamily="34" charset="0"/>
+                </a:rPr>
+                <a:t>100</a:t>
+              </a:r>
+            </a:p>
+          </p:txBody>
+        </p:sp>
+        <p:cxnSp>
+          <p:nvCxnSpPr>
+            <p:cNvPr id="17" name="Straight Connector 16">
+              <a:extLst>
+                <a:ext uri="{FF2B5EF4-FFF2-40B4-BE49-F238E27FC236}">
+                  <a16:creationId xmlns:a16="http://schemas.microsoft.com/office/drawing/2014/main" id="{7D422659-719D-4F3D-8BD3-9FBE9566795E}"/>
+                </a:ext>
+              </a:extLst>
+            </p:cNvPr>
+            <p:cNvCxnSpPr>
+              <a:cxnSpLocks/>
+            </p:cNvCxnSpPr>
+            <p:nvPr/>
+          </p:nvCxnSpPr>
+          <p:spPr>
+            <a:xfrm>
+              <a:off x="3191070" y="2472612"/>
+              <a:ext cx="1872000" cy="0"/>
+            </a:xfrm>
+            <a:prstGeom prst="line">
+              <a:avLst/>
+            </a:prstGeom>
+            <a:ln w="25400">
+              <a:solidFill>
+                <a:schemeClr val="bg1"/>
+              </a:solidFill>
+            </a:ln>
+          </p:spPr>
+          <p:style>
+            <a:lnRef idx="1">
+              <a:schemeClr val="accent1"/>
+            </a:lnRef>
+            <a:fillRef idx="0">
+              <a:schemeClr val="accent1"/>
+            </a:fillRef>
+            <a:effectRef idx="0">
+              <a:schemeClr val="accent1"/>
+            </a:effectRef>
+            <a:fontRef idx="minor">
+              <a:schemeClr val="tx1"/>
+            </a:fontRef>
+          </p:style>
+        </p:cxnSp>
+        <p:sp>
+          <p:nvSpPr>
+            <p:cNvPr id="18" name="TextBox 17">
+              <a:extLst>
+                <a:ext uri="{FF2B5EF4-FFF2-40B4-BE49-F238E27FC236}">
+                  <a16:creationId xmlns:a16="http://schemas.microsoft.com/office/drawing/2014/main" id="{0673B03F-085A-40D0-A24A-2B1037EABB1B}"/>
+                </a:ext>
+              </a:extLst>
+            </p:cNvPr>
+            <p:cNvSpPr txBox="1"/>
+            <p:nvPr/>
+          </p:nvSpPr>
+          <p:spPr>
+            <a:xfrm>
+              <a:off x="3277984" y="1973381"/>
+              <a:ext cx="1698171" cy="369332"/>
+            </a:xfrm>
+            <a:prstGeom prst="rect">
+              <a:avLst/>
+            </a:prstGeom>
+            <a:noFill/>
+          </p:spPr>
+          <p:txBody>
+            <a:bodyPr wrap="square" rtlCol="0">
+              <a:spAutoFit/>
+            </a:bodyPr>
+            <a:lstStyle/>
+            <a:p>
+              <a:pPr algn="ctr"/>
+              <a:r>
+                <a:rPr lang="en-US" dirty="0">
+                  <a:solidFill>
+                    <a:schemeClr val="bg1"/>
+                  </a:solidFill>
+                  <a:latin typeface="Avenir LT Std 65 Medium" panose="020B0803020203020204" pitchFamily="34" charset="0"/>
+                </a:rPr>
+                <a:t>Dataset 3</a:t>
+              </a:r>
+            </a:p>
+          </p:txBody>
+        </p:sp>
+      </p:grpSp>
     </p:spTree>
     <p:extLst>
       <p:ext uri="{BB962C8B-B14F-4D97-AF65-F5344CB8AC3E}">
-        <p14:creationId xmlns:p14="http://schemas.microsoft.com/office/powerpoint/2010/main" val="1404109123"/>
-      </p:ext>
-    </p:extLst>
-  </p:cSld>
-  <p:clrMapOvr>
-    <a:masterClrMapping/>
-  </p:clrMapOvr>
-</p:sld>
-</file>
-
-<file path=ppt/slides/slide6.xml><?xml version="1.0" encoding="utf-8"?>
-<p:sld xmlns:a="http://schemas.openxmlformats.org/drawingml/2006/main" xmlns:r="http://schemas.openxmlformats.org/officeDocument/2006/relationships" xmlns:p="http://schemas.openxmlformats.org/presentationml/2006/main">
-  <p:cSld>
-    <p:spTree>
-      <p:nvGrpSpPr>
-        <p:cNvPr id="1" name=""/>
-        <p:cNvGrpSpPr/>
-        <p:nvPr/>
-      </p:nvGrpSpPr>
-      <p:grpSpPr>
-        <a:xfrm>
-          <a:off x="0" y="0"/>
-          <a:ext cx="0" cy="0"/>
-          <a:chOff x="0" y="0"/>
-          <a:chExt cx="0" cy="0"/>
-        </a:xfrm>
-      </p:grpSpPr>
-      <p:pic>
-        <p:nvPicPr>
-          <p:cNvPr id="3" name="Picture 2" descr="Graphical user interface&#10;&#10;Description automatically generated with medium confidence">
-            <a:extLst>
-              <a:ext uri="{FF2B5EF4-FFF2-40B4-BE49-F238E27FC236}">
-                <a16:creationId xmlns:a16="http://schemas.microsoft.com/office/drawing/2014/main" id="{CBE35007-5346-4E25-8AA8-591DBB87D4A2}"/>
-              </a:ext>
-            </a:extLst>
-          </p:cNvPr>
-          <p:cNvPicPr>
-            <a:picLocks noChangeAspect="1"/>
-          </p:cNvPicPr>
-          <p:nvPr/>
-        </p:nvPicPr>
-        <p:blipFill>
-          <a:blip r:embed="rId2">
-            <a:extLst>
-              <a:ext uri="{28A0092B-C50C-407E-A947-70E740481C1C}">
-                <a14:useLocalDpi xmlns:a14="http://schemas.microsoft.com/office/drawing/2010/main" val="0"/>
-              </a:ext>
-            </a:extLst>
-          </a:blip>
-          <a:stretch>
-            <a:fillRect/>
-          </a:stretch>
-        </p:blipFill>
-        <p:spPr>
-          <a:xfrm>
-            <a:off x="2667000" y="0"/>
-            <a:ext cx="6858000" cy="6858000"/>
-          </a:xfrm>
-          <a:prstGeom prst="rect">
-            <a:avLst/>
-          </a:prstGeom>
-        </p:spPr>
-      </p:pic>
-    </p:spTree>
-    <p:extLst>
-      <p:ext uri="{BB962C8B-B14F-4D97-AF65-F5344CB8AC3E}">
-        <p14:creationId xmlns:p14="http://schemas.microsoft.com/office/powerpoint/2010/main" val="2610551249"/>
+        <p14:creationId xmlns:p14="http://schemas.microsoft.com/office/powerpoint/2010/main" val="2179174096"/>
       </p:ext>
     </p:extLst>
   </p:cSld>
@@ -3936,46 +5340,935 @@
           <a:chExt cx="0" cy="0"/>
         </a:xfrm>
       </p:grpSpPr>
-      <p:pic>
-        <p:nvPicPr>
-          <p:cNvPr id="4" name="Picture 3" descr="Graphical user interface&#10;&#10;Description automatically generated with low confidence">
-            <a:extLst>
-              <a:ext uri="{FF2B5EF4-FFF2-40B4-BE49-F238E27FC236}">
-                <a16:creationId xmlns:a16="http://schemas.microsoft.com/office/drawing/2014/main" id="{67589DDA-5F03-4484-917D-713A6F7D2DD7}"/>
-              </a:ext>
-            </a:extLst>
-          </p:cNvPr>
-          <p:cNvPicPr>
-            <a:picLocks noChangeAspect="1"/>
-          </p:cNvPicPr>
+      <p:sp>
+        <p:nvSpPr>
+          <p:cNvPr id="7" name="Rectangle 6">
+            <a:extLst>
+              <a:ext uri="{FF2B5EF4-FFF2-40B4-BE49-F238E27FC236}">
+                <a16:creationId xmlns:a16="http://schemas.microsoft.com/office/drawing/2014/main" id="{61284827-2C6F-4827-9D1C-BC30E37DD9C8}"/>
+              </a:ext>
+            </a:extLst>
+          </p:cNvPr>
+          <p:cNvSpPr/>
           <p:nvPr/>
-        </p:nvPicPr>
-        <p:blipFill>
-          <a:blip r:embed="rId2">
-            <a:extLst>
-              <a:ext uri="{28A0092B-C50C-407E-A947-70E740481C1C}">
-                <a14:useLocalDpi xmlns:a14="http://schemas.microsoft.com/office/drawing/2010/main" val="0"/>
-              </a:ext>
-            </a:extLst>
-          </a:blip>
-          <a:stretch>
-            <a:fillRect/>
-          </a:stretch>
-        </p:blipFill>
+        </p:nvSpPr>
         <p:spPr>
           <a:xfrm>
-            <a:off x="2667000" y="0"/>
-            <a:ext cx="6858000" cy="6858000"/>
+            <a:off x="4907897" y="4959211"/>
+            <a:ext cx="2052734" cy="979714"/>
           </a:xfrm>
           <a:prstGeom prst="rect">
             <a:avLst/>
           </a:prstGeom>
         </p:spPr>
-      </p:pic>
+        <p:style>
+          <a:lnRef idx="2">
+            <a:schemeClr val="accent1">
+              <a:shade val="50000"/>
+            </a:schemeClr>
+          </a:lnRef>
+          <a:fillRef idx="1">
+            <a:schemeClr val="accent1"/>
+          </a:fillRef>
+          <a:effectRef idx="0">
+            <a:schemeClr val="accent1"/>
+          </a:effectRef>
+          <a:fontRef idx="minor">
+            <a:schemeClr val="lt1"/>
+          </a:fontRef>
+        </p:style>
+        <p:txBody>
+          <a:bodyPr rtlCol="0" anchor="ctr"/>
+          <a:lstStyle/>
+          <a:p>
+            <a:pPr algn="ctr"/>
+            <a:r>
+              <a:rPr lang="en-US" dirty="0">
+                <a:latin typeface="Avenir LT Std 65 Medium" panose="020B0803020203020204" pitchFamily="34" charset="0"/>
+              </a:rPr>
+              <a:t>Result</a:t>
+            </a:r>
+          </a:p>
+        </p:txBody>
+      </p:sp>
+      <p:grpSp>
+        <p:nvGrpSpPr>
+          <p:cNvPr id="28" name="Group 27">
+            <a:extLst>
+              <a:ext uri="{FF2B5EF4-FFF2-40B4-BE49-F238E27FC236}">
+                <a16:creationId xmlns:a16="http://schemas.microsoft.com/office/drawing/2014/main" id="{E3D9A712-114C-4F5C-9B96-0BAEA0F49156}"/>
+              </a:ext>
+            </a:extLst>
+          </p:cNvPr>
+          <p:cNvGrpSpPr/>
+          <p:nvPr/>
+        </p:nvGrpSpPr>
+        <p:grpSpPr>
+          <a:xfrm>
+            <a:off x="1042700" y="200610"/>
+            <a:ext cx="10106597" cy="3228390"/>
+            <a:chOff x="1042701" y="522514"/>
+            <a:chExt cx="10106597" cy="3228390"/>
+          </a:xfrm>
+        </p:grpSpPr>
+        <p:sp>
+          <p:nvSpPr>
+            <p:cNvPr id="26" name="Rectangle 25">
+              <a:extLst>
+                <a:ext uri="{FF2B5EF4-FFF2-40B4-BE49-F238E27FC236}">
+                  <a16:creationId xmlns:a16="http://schemas.microsoft.com/office/drawing/2014/main" id="{2A9E9916-D71A-4E7C-9D4A-8AF93B863E66}"/>
+                </a:ext>
+              </a:extLst>
+            </p:cNvPr>
+            <p:cNvSpPr/>
+            <p:nvPr/>
+          </p:nvSpPr>
+          <p:spPr>
+            <a:xfrm>
+              <a:off x="1042701" y="522514"/>
+              <a:ext cx="10106597" cy="3228390"/>
+            </a:xfrm>
+            <a:prstGeom prst="rect">
+              <a:avLst/>
+            </a:prstGeom>
+            <a:solidFill>
+              <a:schemeClr val="accent2">
+                <a:lumMod val="20000"/>
+                <a:lumOff val="80000"/>
+              </a:schemeClr>
+            </a:solidFill>
+          </p:spPr>
+          <p:style>
+            <a:lnRef idx="2">
+              <a:schemeClr val="accent1">
+                <a:shade val="50000"/>
+              </a:schemeClr>
+            </a:lnRef>
+            <a:fillRef idx="1">
+              <a:schemeClr val="accent1"/>
+            </a:fillRef>
+            <a:effectRef idx="0">
+              <a:schemeClr val="accent1"/>
+            </a:effectRef>
+            <a:fontRef idx="minor">
+              <a:schemeClr val="lt1"/>
+            </a:fontRef>
+          </p:style>
+          <p:txBody>
+            <a:bodyPr rtlCol="0" anchor="ctr"/>
+            <a:lstStyle/>
+            <a:p>
+              <a:pPr algn="ctr"/>
+              <a:endParaRPr lang="en-US"/>
+            </a:p>
+          </p:txBody>
+        </p:sp>
+        <p:sp>
+          <p:nvSpPr>
+            <p:cNvPr id="2" name="Rectangle 1">
+              <a:extLst>
+                <a:ext uri="{FF2B5EF4-FFF2-40B4-BE49-F238E27FC236}">
+                  <a16:creationId xmlns:a16="http://schemas.microsoft.com/office/drawing/2014/main" id="{44D4EA51-2492-48FC-8B98-59C2B181897F}"/>
+                </a:ext>
+              </a:extLst>
+            </p:cNvPr>
+            <p:cNvSpPr/>
+            <p:nvPr/>
+          </p:nvSpPr>
+          <p:spPr>
+            <a:xfrm>
+              <a:off x="1250306" y="732454"/>
+              <a:ext cx="2052734" cy="979714"/>
+            </a:xfrm>
+            <a:prstGeom prst="rect">
+              <a:avLst/>
+            </a:prstGeom>
+          </p:spPr>
+          <p:style>
+            <a:lnRef idx="2">
+              <a:schemeClr val="accent2">
+                <a:shade val="50000"/>
+              </a:schemeClr>
+            </a:lnRef>
+            <a:fillRef idx="1">
+              <a:schemeClr val="accent2"/>
+            </a:fillRef>
+            <a:effectRef idx="0">
+              <a:schemeClr val="accent2"/>
+            </a:effectRef>
+            <a:fontRef idx="minor">
+              <a:schemeClr val="lt1"/>
+            </a:fontRef>
+          </p:style>
+          <p:txBody>
+            <a:bodyPr rtlCol="0" anchor="ctr"/>
+            <a:lstStyle/>
+            <a:p>
+              <a:pPr algn="ctr"/>
+              <a:r>
+                <a:rPr lang="en-US" dirty="0">
+                  <a:latin typeface="Avenir LT Std 65 Medium" panose="020B0803020203020204" pitchFamily="34" charset="0"/>
+                </a:rPr>
+                <a:t>Convolutional Layer</a:t>
+              </a:r>
+            </a:p>
+          </p:txBody>
+        </p:sp>
+        <p:sp>
+          <p:nvSpPr>
+            <p:cNvPr id="8" name="Rectangle 7">
+              <a:extLst>
+                <a:ext uri="{FF2B5EF4-FFF2-40B4-BE49-F238E27FC236}">
+                  <a16:creationId xmlns:a16="http://schemas.microsoft.com/office/drawing/2014/main" id="{EC40E7D3-65D2-4412-AEF5-39AF73A31FE8}"/>
+                </a:ext>
+              </a:extLst>
+            </p:cNvPr>
+            <p:cNvSpPr/>
+            <p:nvPr/>
+          </p:nvSpPr>
+          <p:spPr>
+            <a:xfrm>
+              <a:off x="1250306" y="2542593"/>
+              <a:ext cx="2052734" cy="979714"/>
+            </a:xfrm>
+            <a:prstGeom prst="rect">
+              <a:avLst/>
+            </a:prstGeom>
+          </p:spPr>
+          <p:style>
+            <a:lnRef idx="2">
+              <a:schemeClr val="accent3">
+                <a:shade val="50000"/>
+              </a:schemeClr>
+            </a:lnRef>
+            <a:fillRef idx="1">
+              <a:schemeClr val="accent3"/>
+            </a:fillRef>
+            <a:effectRef idx="0">
+              <a:schemeClr val="accent3"/>
+            </a:effectRef>
+            <a:fontRef idx="minor">
+              <a:schemeClr val="lt1"/>
+            </a:fontRef>
+          </p:style>
+          <p:txBody>
+            <a:bodyPr rtlCol="0" anchor="ctr"/>
+            <a:lstStyle/>
+            <a:p>
+              <a:pPr algn="ctr"/>
+              <a:r>
+                <a:rPr lang="en-US" dirty="0">
+                  <a:latin typeface="Avenir LT Std 65 Medium" panose="020B0803020203020204" pitchFamily="34" charset="0"/>
+                </a:rPr>
+                <a:t>Max Pooling Layer</a:t>
+              </a:r>
+            </a:p>
+          </p:txBody>
+        </p:sp>
+        <p:cxnSp>
+          <p:nvCxnSpPr>
+            <p:cNvPr id="13" name="Straight Arrow Connector 12">
+              <a:extLst>
+                <a:ext uri="{FF2B5EF4-FFF2-40B4-BE49-F238E27FC236}">
+                  <a16:creationId xmlns:a16="http://schemas.microsoft.com/office/drawing/2014/main" id="{D8660343-F1E1-4273-8A43-62EB25D25646}"/>
+                </a:ext>
+              </a:extLst>
+            </p:cNvPr>
+            <p:cNvCxnSpPr/>
+            <p:nvPr/>
+          </p:nvCxnSpPr>
+          <p:spPr>
+            <a:xfrm flipV="1">
+              <a:off x="3610947" y="1492898"/>
+              <a:ext cx="989045" cy="1455575"/>
+            </a:xfrm>
+            <a:prstGeom prst="straightConnector1">
+              <a:avLst/>
+            </a:prstGeom>
+            <a:ln w="57150">
+              <a:tailEnd type="triangle"/>
+            </a:ln>
+          </p:spPr>
+          <p:style>
+            <a:lnRef idx="1">
+              <a:schemeClr val="accent1"/>
+            </a:lnRef>
+            <a:fillRef idx="0">
+              <a:schemeClr val="accent1"/>
+            </a:fillRef>
+            <a:effectRef idx="0">
+              <a:schemeClr val="accent1"/>
+            </a:effectRef>
+            <a:fontRef idx="minor">
+              <a:schemeClr val="tx1"/>
+            </a:fontRef>
+          </p:style>
+        </p:cxnSp>
+        <p:cxnSp>
+          <p:nvCxnSpPr>
+            <p:cNvPr id="16" name="Straight Arrow Connector 15">
+              <a:extLst>
+                <a:ext uri="{FF2B5EF4-FFF2-40B4-BE49-F238E27FC236}">
+                  <a16:creationId xmlns:a16="http://schemas.microsoft.com/office/drawing/2014/main" id="{9009457D-C2DD-4F48-83F9-86CC206FC5BF}"/>
+                </a:ext>
+              </a:extLst>
+            </p:cNvPr>
+            <p:cNvCxnSpPr/>
+            <p:nvPr/>
+          </p:nvCxnSpPr>
+          <p:spPr>
+            <a:xfrm>
+              <a:off x="2276673" y="1940766"/>
+              <a:ext cx="0" cy="391886"/>
+            </a:xfrm>
+            <a:prstGeom prst="straightConnector1">
+              <a:avLst/>
+            </a:prstGeom>
+            <a:ln w="57150">
+              <a:tailEnd type="triangle"/>
+            </a:ln>
+          </p:spPr>
+          <p:style>
+            <a:lnRef idx="1">
+              <a:schemeClr val="accent1"/>
+            </a:lnRef>
+            <a:fillRef idx="0">
+              <a:schemeClr val="accent1"/>
+            </a:fillRef>
+            <a:effectRef idx="0">
+              <a:schemeClr val="accent1"/>
+            </a:effectRef>
+            <a:fontRef idx="minor">
+              <a:schemeClr val="tx1"/>
+            </a:fontRef>
+          </p:style>
+        </p:cxnSp>
+        <p:sp>
+          <p:nvSpPr>
+            <p:cNvPr id="19" name="Rectangle 18">
+              <a:extLst>
+                <a:ext uri="{FF2B5EF4-FFF2-40B4-BE49-F238E27FC236}">
+                  <a16:creationId xmlns:a16="http://schemas.microsoft.com/office/drawing/2014/main" id="{3B8571C0-7450-48E4-94CA-E7CBD834FDC1}"/>
+                </a:ext>
+              </a:extLst>
+            </p:cNvPr>
+            <p:cNvSpPr/>
+            <p:nvPr/>
+          </p:nvSpPr>
+          <p:spPr>
+            <a:xfrm>
+              <a:off x="4907898" y="732454"/>
+              <a:ext cx="2052734" cy="979714"/>
+            </a:xfrm>
+            <a:prstGeom prst="rect">
+              <a:avLst/>
+            </a:prstGeom>
+          </p:spPr>
+          <p:style>
+            <a:lnRef idx="2">
+              <a:schemeClr val="accent2">
+                <a:shade val="50000"/>
+              </a:schemeClr>
+            </a:lnRef>
+            <a:fillRef idx="1">
+              <a:schemeClr val="accent2"/>
+            </a:fillRef>
+            <a:effectRef idx="0">
+              <a:schemeClr val="accent2"/>
+            </a:effectRef>
+            <a:fontRef idx="minor">
+              <a:schemeClr val="lt1"/>
+            </a:fontRef>
+          </p:style>
+          <p:txBody>
+            <a:bodyPr rtlCol="0" anchor="ctr"/>
+            <a:lstStyle/>
+            <a:p>
+              <a:pPr algn="ctr"/>
+              <a:r>
+                <a:rPr lang="en-US" dirty="0">
+                  <a:latin typeface="Avenir LT Std 65 Medium" panose="020B0803020203020204" pitchFamily="34" charset="0"/>
+                </a:rPr>
+                <a:t>Convolutional Layer</a:t>
+              </a:r>
+            </a:p>
+          </p:txBody>
+        </p:sp>
+        <p:sp>
+          <p:nvSpPr>
+            <p:cNvPr id="20" name="Rectangle 19">
+              <a:extLst>
+                <a:ext uri="{FF2B5EF4-FFF2-40B4-BE49-F238E27FC236}">
+                  <a16:creationId xmlns:a16="http://schemas.microsoft.com/office/drawing/2014/main" id="{4DD87069-A75F-4D45-9330-108E04E94367}"/>
+                </a:ext>
+              </a:extLst>
+            </p:cNvPr>
+            <p:cNvSpPr/>
+            <p:nvPr/>
+          </p:nvSpPr>
+          <p:spPr>
+            <a:xfrm>
+              <a:off x="4907898" y="2542593"/>
+              <a:ext cx="2052734" cy="979714"/>
+            </a:xfrm>
+            <a:prstGeom prst="rect">
+              <a:avLst/>
+            </a:prstGeom>
+          </p:spPr>
+          <p:style>
+            <a:lnRef idx="2">
+              <a:schemeClr val="accent3">
+                <a:shade val="50000"/>
+              </a:schemeClr>
+            </a:lnRef>
+            <a:fillRef idx="1">
+              <a:schemeClr val="accent3"/>
+            </a:fillRef>
+            <a:effectRef idx="0">
+              <a:schemeClr val="accent3"/>
+            </a:effectRef>
+            <a:fontRef idx="minor">
+              <a:schemeClr val="lt1"/>
+            </a:fontRef>
+          </p:style>
+          <p:txBody>
+            <a:bodyPr rtlCol="0" anchor="ctr"/>
+            <a:lstStyle/>
+            <a:p>
+              <a:pPr algn="ctr"/>
+              <a:r>
+                <a:rPr lang="en-US">
+                  <a:latin typeface="Avenir LT Std 65 Medium" panose="020B0803020203020204" pitchFamily="34" charset="0"/>
+                </a:rPr>
+                <a:t>Max Pooling Layer</a:t>
+              </a:r>
+              <a:endParaRPr lang="en-US" dirty="0">
+                <a:latin typeface="Avenir LT Std 65 Medium" panose="020B0803020203020204" pitchFamily="34" charset="0"/>
+              </a:endParaRPr>
+            </a:p>
+          </p:txBody>
+        </p:sp>
+        <p:cxnSp>
+          <p:nvCxnSpPr>
+            <p:cNvPr id="21" name="Straight Arrow Connector 20">
+              <a:extLst>
+                <a:ext uri="{FF2B5EF4-FFF2-40B4-BE49-F238E27FC236}">
+                  <a16:creationId xmlns:a16="http://schemas.microsoft.com/office/drawing/2014/main" id="{60BA597F-05A4-4B89-A86F-F9DA1B8B85CD}"/>
+                </a:ext>
+              </a:extLst>
+            </p:cNvPr>
+            <p:cNvCxnSpPr/>
+            <p:nvPr/>
+          </p:nvCxnSpPr>
+          <p:spPr>
+            <a:xfrm>
+              <a:off x="5934265" y="1940766"/>
+              <a:ext cx="0" cy="391886"/>
+            </a:xfrm>
+            <a:prstGeom prst="straightConnector1">
+              <a:avLst/>
+            </a:prstGeom>
+            <a:ln w="57150">
+              <a:tailEnd type="triangle"/>
+            </a:ln>
+          </p:spPr>
+          <p:style>
+            <a:lnRef idx="1">
+              <a:schemeClr val="accent1"/>
+            </a:lnRef>
+            <a:fillRef idx="0">
+              <a:schemeClr val="accent1"/>
+            </a:fillRef>
+            <a:effectRef idx="0">
+              <a:schemeClr val="accent1"/>
+            </a:effectRef>
+            <a:fontRef idx="minor">
+              <a:schemeClr val="tx1"/>
+            </a:fontRef>
+          </p:style>
+        </p:cxnSp>
+        <p:sp>
+          <p:nvSpPr>
+            <p:cNvPr id="22" name="Rectangle 21">
+              <a:extLst>
+                <a:ext uri="{FF2B5EF4-FFF2-40B4-BE49-F238E27FC236}">
+                  <a16:creationId xmlns:a16="http://schemas.microsoft.com/office/drawing/2014/main" id="{A3B76C8C-4EBF-4480-8FB8-4E8EE497A870}"/>
+                </a:ext>
+              </a:extLst>
+            </p:cNvPr>
+            <p:cNvSpPr/>
+            <p:nvPr/>
+          </p:nvSpPr>
+          <p:spPr>
+            <a:xfrm>
+              <a:off x="8565492" y="732454"/>
+              <a:ext cx="2052734" cy="979714"/>
+            </a:xfrm>
+            <a:prstGeom prst="rect">
+              <a:avLst/>
+            </a:prstGeom>
+          </p:spPr>
+          <p:style>
+            <a:lnRef idx="2">
+              <a:schemeClr val="accent2">
+                <a:shade val="50000"/>
+              </a:schemeClr>
+            </a:lnRef>
+            <a:fillRef idx="1">
+              <a:schemeClr val="accent2"/>
+            </a:fillRef>
+            <a:effectRef idx="0">
+              <a:schemeClr val="accent2"/>
+            </a:effectRef>
+            <a:fontRef idx="minor">
+              <a:schemeClr val="lt1"/>
+            </a:fontRef>
+          </p:style>
+          <p:txBody>
+            <a:bodyPr rtlCol="0" anchor="ctr"/>
+            <a:lstStyle/>
+            <a:p>
+              <a:pPr algn="ctr"/>
+              <a:r>
+                <a:rPr lang="en-US" dirty="0">
+                  <a:latin typeface="Avenir LT Std 65 Medium" panose="020B0803020203020204" pitchFamily="34" charset="0"/>
+                </a:rPr>
+                <a:t>Convolutional Layer</a:t>
+              </a:r>
+            </a:p>
+          </p:txBody>
+        </p:sp>
+        <p:sp>
+          <p:nvSpPr>
+            <p:cNvPr id="23" name="Rectangle 22">
+              <a:extLst>
+                <a:ext uri="{FF2B5EF4-FFF2-40B4-BE49-F238E27FC236}">
+                  <a16:creationId xmlns:a16="http://schemas.microsoft.com/office/drawing/2014/main" id="{C2DD0673-D141-43EC-A2E8-263A7682EC2B}"/>
+                </a:ext>
+              </a:extLst>
+            </p:cNvPr>
+            <p:cNvSpPr/>
+            <p:nvPr/>
+          </p:nvSpPr>
+          <p:spPr>
+            <a:xfrm>
+              <a:off x="8565492" y="2542593"/>
+              <a:ext cx="2052734" cy="979714"/>
+            </a:xfrm>
+            <a:prstGeom prst="rect">
+              <a:avLst/>
+            </a:prstGeom>
+          </p:spPr>
+          <p:style>
+            <a:lnRef idx="2">
+              <a:schemeClr val="accent3">
+                <a:shade val="50000"/>
+              </a:schemeClr>
+            </a:lnRef>
+            <a:fillRef idx="1">
+              <a:schemeClr val="accent3"/>
+            </a:fillRef>
+            <a:effectRef idx="0">
+              <a:schemeClr val="accent3"/>
+            </a:effectRef>
+            <a:fontRef idx="minor">
+              <a:schemeClr val="lt1"/>
+            </a:fontRef>
+          </p:style>
+          <p:txBody>
+            <a:bodyPr rtlCol="0" anchor="ctr"/>
+            <a:lstStyle/>
+            <a:p>
+              <a:pPr algn="ctr"/>
+              <a:r>
+                <a:rPr lang="en-US">
+                  <a:latin typeface="Avenir LT Std 65 Medium" panose="020B0803020203020204" pitchFamily="34" charset="0"/>
+                </a:rPr>
+                <a:t>Max Pooling Layer</a:t>
+              </a:r>
+              <a:endParaRPr lang="en-US" dirty="0">
+                <a:latin typeface="Avenir LT Std 65 Medium" panose="020B0803020203020204" pitchFamily="34" charset="0"/>
+              </a:endParaRPr>
+            </a:p>
+          </p:txBody>
+        </p:sp>
+        <p:cxnSp>
+          <p:nvCxnSpPr>
+            <p:cNvPr id="24" name="Straight Arrow Connector 23">
+              <a:extLst>
+                <a:ext uri="{FF2B5EF4-FFF2-40B4-BE49-F238E27FC236}">
+                  <a16:creationId xmlns:a16="http://schemas.microsoft.com/office/drawing/2014/main" id="{05A504F6-7F78-4D5D-9BB8-CB412B95454B}"/>
+                </a:ext>
+              </a:extLst>
+            </p:cNvPr>
+            <p:cNvCxnSpPr/>
+            <p:nvPr/>
+          </p:nvCxnSpPr>
+          <p:spPr>
+            <a:xfrm>
+              <a:off x="9591859" y="1940766"/>
+              <a:ext cx="0" cy="391886"/>
+            </a:xfrm>
+            <a:prstGeom prst="straightConnector1">
+              <a:avLst/>
+            </a:prstGeom>
+            <a:ln w="57150">
+              <a:tailEnd type="triangle"/>
+            </a:ln>
+          </p:spPr>
+          <p:style>
+            <a:lnRef idx="1">
+              <a:schemeClr val="accent1"/>
+            </a:lnRef>
+            <a:fillRef idx="0">
+              <a:schemeClr val="accent1"/>
+            </a:fillRef>
+            <a:effectRef idx="0">
+              <a:schemeClr val="accent1"/>
+            </a:effectRef>
+            <a:fontRef idx="minor">
+              <a:schemeClr val="tx1"/>
+            </a:fontRef>
+          </p:style>
+        </p:cxnSp>
+        <p:cxnSp>
+          <p:nvCxnSpPr>
+            <p:cNvPr id="25" name="Straight Arrow Connector 24">
+              <a:extLst>
+                <a:ext uri="{FF2B5EF4-FFF2-40B4-BE49-F238E27FC236}">
+                  <a16:creationId xmlns:a16="http://schemas.microsoft.com/office/drawing/2014/main" id="{B6E02636-BA8F-4C1A-ACAE-8E2D0411414A}"/>
+                </a:ext>
+              </a:extLst>
+            </p:cNvPr>
+            <p:cNvCxnSpPr/>
+            <p:nvPr/>
+          </p:nvCxnSpPr>
+          <p:spPr>
+            <a:xfrm flipV="1">
+              <a:off x="7268540" y="1492898"/>
+              <a:ext cx="989045" cy="1455575"/>
+            </a:xfrm>
+            <a:prstGeom prst="straightConnector1">
+              <a:avLst/>
+            </a:prstGeom>
+            <a:ln w="57150">
+              <a:tailEnd type="triangle"/>
+            </a:ln>
+          </p:spPr>
+          <p:style>
+            <a:lnRef idx="1">
+              <a:schemeClr val="accent1"/>
+            </a:lnRef>
+            <a:fillRef idx="0">
+              <a:schemeClr val="accent1"/>
+            </a:fillRef>
+            <a:effectRef idx="0">
+              <a:schemeClr val="accent1"/>
+            </a:effectRef>
+            <a:fontRef idx="minor">
+              <a:schemeClr val="tx1"/>
+            </a:fontRef>
+          </p:style>
+        </p:cxnSp>
+      </p:grpSp>
+      <p:cxnSp>
+        <p:nvCxnSpPr>
+          <p:cNvPr id="27" name="Straight Arrow Connector 26">
+            <a:extLst>
+              <a:ext uri="{FF2B5EF4-FFF2-40B4-BE49-F238E27FC236}">
+                <a16:creationId xmlns:a16="http://schemas.microsoft.com/office/drawing/2014/main" id="{C2C96FEA-286F-41E1-9C35-67588D9A19FF}"/>
+              </a:ext>
+            </a:extLst>
+          </p:cNvPr>
+          <p:cNvCxnSpPr/>
+          <p:nvPr/>
+        </p:nvCxnSpPr>
+        <p:spPr>
+          <a:xfrm>
+            <a:off x="9958483" y="3568957"/>
+            <a:ext cx="0" cy="391886"/>
+          </a:xfrm>
+          <a:prstGeom prst="straightConnector1">
+            <a:avLst/>
+          </a:prstGeom>
+          <a:ln w="57150">
+            <a:tailEnd type="triangle"/>
+          </a:ln>
+        </p:spPr>
+        <p:style>
+          <a:lnRef idx="1">
+            <a:schemeClr val="accent1"/>
+          </a:lnRef>
+          <a:fillRef idx="0">
+            <a:schemeClr val="accent1"/>
+          </a:fillRef>
+          <a:effectRef idx="0">
+            <a:schemeClr val="accent1"/>
+          </a:effectRef>
+          <a:fontRef idx="minor">
+            <a:schemeClr val="tx1"/>
+          </a:fontRef>
+        </p:style>
+      </p:cxnSp>
+      <p:grpSp>
+        <p:nvGrpSpPr>
+          <p:cNvPr id="32" name="Group 31">
+            <a:extLst>
+              <a:ext uri="{FF2B5EF4-FFF2-40B4-BE49-F238E27FC236}">
+                <a16:creationId xmlns:a16="http://schemas.microsoft.com/office/drawing/2014/main" id="{25C2DB64-BCAD-4353-B55B-006C1C6C99B6}"/>
+              </a:ext>
+            </a:extLst>
+          </p:cNvPr>
+          <p:cNvGrpSpPr/>
+          <p:nvPr/>
+        </p:nvGrpSpPr>
+        <p:grpSpPr>
+          <a:xfrm>
+            <a:off x="8767670" y="4030828"/>
+            <a:ext cx="2381627" cy="2684885"/>
+            <a:chOff x="2964418" y="1103342"/>
+            <a:chExt cx="2381627" cy="2684885"/>
+          </a:xfrm>
+        </p:grpSpPr>
+        <p:sp>
+          <p:nvSpPr>
+            <p:cNvPr id="33" name="Rectangle 32">
+              <a:extLst>
+                <a:ext uri="{FF2B5EF4-FFF2-40B4-BE49-F238E27FC236}">
+                  <a16:creationId xmlns:a16="http://schemas.microsoft.com/office/drawing/2014/main" id="{C4FE4223-CCF0-4173-A139-3F664D2E55AF}"/>
+                </a:ext>
+              </a:extLst>
+            </p:cNvPr>
+            <p:cNvSpPr/>
+            <p:nvPr/>
+          </p:nvSpPr>
+          <p:spPr>
+            <a:xfrm>
+              <a:off x="2964418" y="1103342"/>
+              <a:ext cx="2381627" cy="2684885"/>
+            </a:xfrm>
+            <a:prstGeom prst="rect">
+              <a:avLst/>
+            </a:prstGeom>
+            <a:solidFill>
+              <a:schemeClr val="accent1">
+                <a:lumMod val="20000"/>
+                <a:lumOff val="80000"/>
+              </a:schemeClr>
+            </a:solidFill>
+          </p:spPr>
+          <p:style>
+            <a:lnRef idx="2">
+              <a:schemeClr val="accent1">
+                <a:shade val="50000"/>
+              </a:schemeClr>
+            </a:lnRef>
+            <a:fillRef idx="1">
+              <a:schemeClr val="accent1"/>
+            </a:fillRef>
+            <a:effectRef idx="0">
+              <a:schemeClr val="accent1"/>
+            </a:effectRef>
+            <a:fontRef idx="minor">
+              <a:schemeClr val="lt1"/>
+            </a:fontRef>
+          </p:style>
+          <p:txBody>
+            <a:bodyPr rtlCol="0" anchor="ctr"/>
+            <a:lstStyle/>
+            <a:p>
+              <a:pPr algn="ctr"/>
+              <a:endParaRPr lang="en-US"/>
+            </a:p>
+          </p:txBody>
+        </p:sp>
+        <p:sp>
+          <p:nvSpPr>
+            <p:cNvPr id="34" name="Rectangle 33">
+              <a:extLst>
+                <a:ext uri="{FF2B5EF4-FFF2-40B4-BE49-F238E27FC236}">
+                  <a16:creationId xmlns:a16="http://schemas.microsoft.com/office/drawing/2014/main" id="{61C806FA-B748-4675-8EF3-B95C1C8F2FCF}"/>
+                </a:ext>
+              </a:extLst>
+            </p:cNvPr>
+            <p:cNvSpPr/>
+            <p:nvPr/>
+          </p:nvSpPr>
+          <p:spPr>
+            <a:xfrm>
+              <a:off x="3128864" y="2711123"/>
+              <a:ext cx="2052734" cy="979714"/>
+            </a:xfrm>
+            <a:prstGeom prst="rect">
+              <a:avLst/>
+            </a:prstGeom>
+          </p:spPr>
+          <p:style>
+            <a:lnRef idx="2">
+              <a:schemeClr val="accent1">
+                <a:shade val="50000"/>
+              </a:schemeClr>
+            </a:lnRef>
+            <a:fillRef idx="1">
+              <a:schemeClr val="accent1"/>
+            </a:fillRef>
+            <a:effectRef idx="0">
+              <a:schemeClr val="accent1"/>
+            </a:effectRef>
+            <a:fontRef idx="minor">
+              <a:schemeClr val="lt1"/>
+            </a:fontRef>
+          </p:style>
+          <p:txBody>
+            <a:bodyPr rtlCol="0" anchor="ctr"/>
+            <a:lstStyle/>
+            <a:p>
+              <a:pPr algn="ctr"/>
+              <a:r>
+                <a:rPr lang="en-US" dirty="0">
+                  <a:latin typeface="Avenir LT Std 65 Medium" panose="020B0803020203020204" pitchFamily="34" charset="0"/>
+                </a:rPr>
+                <a:t>Dense Layer</a:t>
+              </a:r>
+            </a:p>
+          </p:txBody>
+        </p:sp>
+        <p:sp>
+          <p:nvSpPr>
+            <p:cNvPr id="35" name="Rectangle 34">
+              <a:extLst>
+                <a:ext uri="{FF2B5EF4-FFF2-40B4-BE49-F238E27FC236}">
+                  <a16:creationId xmlns:a16="http://schemas.microsoft.com/office/drawing/2014/main" id="{119AC45F-BF90-443F-BABC-AF4D0446DBBC}"/>
+                </a:ext>
+              </a:extLst>
+            </p:cNvPr>
+            <p:cNvSpPr/>
+            <p:nvPr/>
+          </p:nvSpPr>
+          <p:spPr>
+            <a:xfrm>
+              <a:off x="3128864" y="1200731"/>
+              <a:ext cx="2052734" cy="979714"/>
+            </a:xfrm>
+            <a:prstGeom prst="rect">
+              <a:avLst/>
+            </a:prstGeom>
+          </p:spPr>
+          <p:style>
+            <a:lnRef idx="2">
+              <a:schemeClr val="accent1">
+                <a:shade val="50000"/>
+              </a:schemeClr>
+            </a:lnRef>
+            <a:fillRef idx="1">
+              <a:schemeClr val="accent1"/>
+            </a:fillRef>
+            <a:effectRef idx="0">
+              <a:schemeClr val="accent1"/>
+            </a:effectRef>
+            <a:fontRef idx="minor">
+              <a:schemeClr val="lt1"/>
+            </a:fontRef>
+          </p:style>
+          <p:txBody>
+            <a:bodyPr rtlCol="0" anchor="ctr"/>
+            <a:lstStyle/>
+            <a:p>
+              <a:pPr algn="ctr"/>
+              <a:r>
+                <a:rPr lang="en-US" dirty="0">
+                  <a:latin typeface="Avenir LT Std 65 Medium" panose="020B0803020203020204" pitchFamily="34" charset="0"/>
+                </a:rPr>
+                <a:t>Dense Layer</a:t>
+              </a:r>
+            </a:p>
+          </p:txBody>
+        </p:sp>
+        <p:cxnSp>
+          <p:nvCxnSpPr>
+            <p:cNvPr id="36" name="Straight Arrow Connector 35">
+              <a:extLst>
+                <a:ext uri="{FF2B5EF4-FFF2-40B4-BE49-F238E27FC236}">
+                  <a16:creationId xmlns:a16="http://schemas.microsoft.com/office/drawing/2014/main" id="{9602E62B-427F-4C44-AF79-486A6AD3DF7B}"/>
+                </a:ext>
+              </a:extLst>
+            </p:cNvPr>
+            <p:cNvCxnSpPr/>
+            <p:nvPr/>
+          </p:nvCxnSpPr>
+          <p:spPr>
+            <a:xfrm>
+              <a:off x="4158353" y="2249841"/>
+              <a:ext cx="0" cy="391886"/>
+            </a:xfrm>
+            <a:prstGeom prst="straightConnector1">
+              <a:avLst/>
+            </a:prstGeom>
+            <a:ln w="57150">
+              <a:tailEnd type="triangle"/>
+            </a:ln>
+          </p:spPr>
+          <p:style>
+            <a:lnRef idx="1">
+              <a:schemeClr val="accent1"/>
+            </a:lnRef>
+            <a:fillRef idx="0">
+              <a:schemeClr val="accent1"/>
+            </a:fillRef>
+            <a:effectRef idx="0">
+              <a:schemeClr val="accent1"/>
+            </a:effectRef>
+            <a:fontRef idx="minor">
+              <a:schemeClr val="tx1"/>
+            </a:fontRef>
+          </p:style>
+        </p:cxnSp>
+      </p:grpSp>
+      <p:cxnSp>
+        <p:nvCxnSpPr>
+          <p:cNvPr id="37" name="Straight Arrow Connector 36">
+            <a:extLst>
+              <a:ext uri="{FF2B5EF4-FFF2-40B4-BE49-F238E27FC236}">
+                <a16:creationId xmlns:a16="http://schemas.microsoft.com/office/drawing/2014/main" id="{5499FB6A-7B09-435F-B714-03148BD70D09}"/>
+              </a:ext>
+            </a:extLst>
+          </p:cNvPr>
+          <p:cNvCxnSpPr>
+            <a:cxnSpLocks/>
+          </p:cNvCxnSpPr>
+          <p:nvPr/>
+        </p:nvCxnSpPr>
+        <p:spPr>
+          <a:xfrm flipH="1" flipV="1">
+            <a:off x="7513870" y="5449068"/>
+            <a:ext cx="640696" cy="2"/>
+          </a:xfrm>
+          <a:prstGeom prst="straightConnector1">
+            <a:avLst/>
+          </a:prstGeom>
+          <a:ln w="57150">
+            <a:tailEnd type="triangle"/>
+          </a:ln>
+        </p:spPr>
+        <p:style>
+          <a:lnRef idx="1">
+            <a:schemeClr val="accent1"/>
+          </a:lnRef>
+          <a:fillRef idx="0">
+            <a:schemeClr val="accent1"/>
+          </a:fillRef>
+          <a:effectRef idx="0">
+            <a:schemeClr val="accent1"/>
+          </a:effectRef>
+          <a:fontRef idx="minor">
+            <a:schemeClr val="tx1"/>
+          </a:fontRef>
+        </p:style>
+      </p:cxnSp>
     </p:spTree>
     <p:extLst>
       <p:ext uri="{BB962C8B-B14F-4D97-AF65-F5344CB8AC3E}">
-        <p14:creationId xmlns:p14="http://schemas.microsoft.com/office/powerpoint/2010/main" val="1920912514"/>
+        <p14:creationId xmlns:p14="http://schemas.microsoft.com/office/powerpoint/2010/main" val="1404109123"/>
       </p:ext>
     </p:extLst>
   </p:cSld>
@@ -4002,12 +6295,49 @@
           <a:chExt cx="0" cy="0"/>
         </a:xfrm>
       </p:grpSpPr>
+      <p:sp>
+        <p:nvSpPr>
+          <p:cNvPr id="2" name="TextBox 1">
+            <a:extLst>
+              <a:ext uri="{FF2B5EF4-FFF2-40B4-BE49-F238E27FC236}">
+                <a16:creationId xmlns:a16="http://schemas.microsoft.com/office/drawing/2014/main" id="{D963301D-142D-4C04-B3A0-1EF9D3574CC7}"/>
+              </a:ext>
+            </a:extLst>
+          </p:cNvPr>
+          <p:cNvSpPr txBox="1"/>
+          <p:nvPr/>
+        </p:nvSpPr>
+        <p:spPr>
+          <a:xfrm>
+            <a:off x="4411824" y="5621691"/>
+            <a:ext cx="3368351" cy="369332"/>
+          </a:xfrm>
+          <a:prstGeom prst="rect">
+            <a:avLst/>
+          </a:prstGeom>
+          <a:noFill/>
+        </p:spPr>
+        <p:txBody>
+          <a:bodyPr wrap="square" rtlCol="0">
+            <a:spAutoFit/>
+          </a:bodyPr>
+          <a:lstStyle/>
+          <a:p>
+            <a:r>
+              <a:rPr lang="en-US" dirty="0">
+                <a:latin typeface="Avenir LT Std 65 Medium" panose="020B0803020203020204" pitchFamily="34" charset="0"/>
+              </a:rPr>
+              <a:t>Baseline Accuracy: 10-12 %</a:t>
+            </a:r>
+          </a:p>
+        </p:txBody>
+      </p:sp>
       <p:pic>
         <p:nvPicPr>
-          <p:cNvPr id="3" name="Picture 2" descr="A picture containing graphical user interface&#10;&#10;Description automatically generated">
-            <a:extLst>
-              <a:ext uri="{FF2B5EF4-FFF2-40B4-BE49-F238E27FC236}">
-                <a16:creationId xmlns:a16="http://schemas.microsoft.com/office/drawing/2014/main" id="{181E4A29-1C59-4104-971B-35863BC00435}"/>
+          <p:cNvPr id="5" name="Picture 4" descr="Chart, bar chart&#10;&#10;Description automatically generated">
+            <a:extLst>
+              <a:ext uri="{FF2B5EF4-FFF2-40B4-BE49-F238E27FC236}">
+                <a16:creationId xmlns:a16="http://schemas.microsoft.com/office/drawing/2014/main" id="{EC031C2B-3D77-4D5D-A93E-84ED8DBFB990}"/>
               </a:ext>
             </a:extLst>
           </p:cNvPr>
@@ -4030,8 +6360,8 @@
         </p:blipFill>
         <p:spPr>
           <a:xfrm>
-            <a:off x="2667000" y="0"/>
-            <a:ext cx="6858000" cy="6858000"/>
+            <a:off x="2353903" y="541919"/>
+            <a:ext cx="7484191" cy="4989461"/>
           </a:xfrm>
           <a:prstGeom prst="rect">
             <a:avLst/>
@@ -4041,7 +6371,7 @@
     </p:spTree>
     <p:extLst>
       <p:ext uri="{BB962C8B-B14F-4D97-AF65-F5344CB8AC3E}">
-        <p14:creationId xmlns:p14="http://schemas.microsoft.com/office/powerpoint/2010/main" val="3743300472"/>
+        <p14:creationId xmlns:p14="http://schemas.microsoft.com/office/powerpoint/2010/main" val="4038566702"/>
       </p:ext>
     </p:extLst>
   </p:cSld>
@@ -4070,10 +6400,10 @@
       </p:grpSpPr>
       <p:pic>
         <p:nvPicPr>
-          <p:cNvPr id="3" name="Picture 2" descr="A picture containing chart&#10;&#10;Description automatically generated">
-            <a:extLst>
-              <a:ext uri="{FF2B5EF4-FFF2-40B4-BE49-F238E27FC236}">
-                <a16:creationId xmlns:a16="http://schemas.microsoft.com/office/drawing/2014/main" id="{359E25E3-49C7-4454-9B10-2DF59B568B7A}"/>
+          <p:cNvPr id="3" name="Picture 2" descr="Graphical user interface&#10;&#10;Description automatically generated with medium confidence">
+            <a:extLst>
+              <a:ext uri="{FF2B5EF4-FFF2-40B4-BE49-F238E27FC236}">
+                <a16:creationId xmlns:a16="http://schemas.microsoft.com/office/drawing/2014/main" id="{CBE35007-5346-4E25-8AA8-591DBB87D4A2}"/>
               </a:ext>
             </a:extLst>
           </p:cNvPr>
@@ -4096,7 +6426,7 @@
         </p:blipFill>
         <p:spPr>
           <a:xfrm>
-            <a:off x="2667000" y="0"/>
+            <a:off x="5040000" y="0"/>
             <a:ext cx="6858000" cy="6858000"/>
           </a:xfrm>
           <a:prstGeom prst="rect">
@@ -4104,10 +6434,170 @@
           </a:prstGeom>
         </p:spPr>
       </p:pic>
+      <p:grpSp>
+        <p:nvGrpSpPr>
+          <p:cNvPr id="5" name="Group 4">
+            <a:extLst>
+              <a:ext uri="{FF2B5EF4-FFF2-40B4-BE49-F238E27FC236}">
+                <a16:creationId xmlns:a16="http://schemas.microsoft.com/office/drawing/2014/main" id="{180D738C-ADA8-4802-8D76-F2FB1B9A1C19}"/>
+              </a:ext>
+            </a:extLst>
+          </p:cNvPr>
+          <p:cNvGrpSpPr/>
+          <p:nvPr/>
+        </p:nvGrpSpPr>
+        <p:grpSpPr>
+          <a:xfrm>
+            <a:off x="1260000" y="1843481"/>
+            <a:ext cx="2692866" cy="3171038"/>
+            <a:chOff x="2768368" y="1843481"/>
+            <a:chExt cx="2692866" cy="3171038"/>
+          </a:xfrm>
+        </p:grpSpPr>
+        <p:sp>
+          <p:nvSpPr>
+            <p:cNvPr id="6" name="Rectangle 5">
+              <a:extLst>
+                <a:ext uri="{FF2B5EF4-FFF2-40B4-BE49-F238E27FC236}">
+                  <a16:creationId xmlns:a16="http://schemas.microsoft.com/office/drawing/2014/main" id="{A5322AF8-61E9-40BF-8D4C-B56F7A9F1BCB}"/>
+                </a:ext>
+              </a:extLst>
+            </p:cNvPr>
+            <p:cNvSpPr/>
+            <p:nvPr/>
+          </p:nvSpPr>
+          <p:spPr>
+            <a:xfrm>
+              <a:off x="2768368" y="1843481"/>
+              <a:ext cx="2692866" cy="3171038"/>
+            </a:xfrm>
+            <a:prstGeom prst="rect">
+              <a:avLst/>
+            </a:prstGeom>
+            <a:ln w="12700" cmpd="sng">
+              <a:round/>
+            </a:ln>
+            <a:effectLst/>
+          </p:spPr>
+          <p:style>
+            <a:lnRef idx="2">
+              <a:schemeClr val="accent1">
+                <a:shade val="50000"/>
+              </a:schemeClr>
+            </a:lnRef>
+            <a:fillRef idx="1">
+              <a:schemeClr val="accent1"/>
+            </a:fillRef>
+            <a:effectRef idx="0">
+              <a:schemeClr val="accent1"/>
+            </a:effectRef>
+            <a:fontRef idx="minor">
+              <a:schemeClr val="lt1"/>
+            </a:fontRef>
+          </p:style>
+          <p:txBody>
+            <a:bodyPr rtlCol="0" anchor="ctr"/>
+            <a:lstStyle/>
+            <a:p>
+              <a:pPr algn="ctr"/>
+              <a:r>
+                <a:rPr lang="en-US" dirty="0">
+                  <a:latin typeface="Avenir Next LT Pro" panose="020B0504020202020204" pitchFamily="34" charset="0"/>
+                </a:rPr>
+                <a:t>No Filter</a:t>
+              </a:r>
+            </a:p>
+          </p:txBody>
+        </p:sp>
+        <p:cxnSp>
+          <p:nvCxnSpPr>
+            <p:cNvPr id="7" name="Straight Connector 6">
+              <a:extLst>
+                <a:ext uri="{FF2B5EF4-FFF2-40B4-BE49-F238E27FC236}">
+                  <a16:creationId xmlns:a16="http://schemas.microsoft.com/office/drawing/2014/main" id="{A20C6AB3-738A-43FB-8B4D-8DBE953D8737}"/>
+                </a:ext>
+              </a:extLst>
+            </p:cNvPr>
+            <p:cNvCxnSpPr>
+              <a:cxnSpLocks/>
+            </p:cNvCxnSpPr>
+            <p:nvPr/>
+          </p:nvCxnSpPr>
+          <p:spPr>
+            <a:xfrm>
+              <a:off x="3191070" y="2472612"/>
+              <a:ext cx="1872000" cy="0"/>
+            </a:xfrm>
+            <a:prstGeom prst="line">
+              <a:avLst/>
+            </a:prstGeom>
+            <a:ln w="25400">
+              <a:solidFill>
+                <a:schemeClr val="bg1"/>
+              </a:solidFill>
+            </a:ln>
+          </p:spPr>
+          <p:style>
+            <a:lnRef idx="1">
+              <a:schemeClr val="accent1"/>
+            </a:lnRef>
+            <a:fillRef idx="0">
+              <a:schemeClr val="accent1"/>
+            </a:fillRef>
+            <a:effectRef idx="0">
+              <a:schemeClr val="accent1"/>
+            </a:effectRef>
+            <a:fontRef idx="minor">
+              <a:schemeClr val="tx1"/>
+            </a:fontRef>
+          </p:style>
+        </p:cxnSp>
+        <p:sp>
+          <p:nvSpPr>
+            <p:cNvPr id="8" name="TextBox 7">
+              <a:extLst>
+                <a:ext uri="{FF2B5EF4-FFF2-40B4-BE49-F238E27FC236}">
+                  <a16:creationId xmlns:a16="http://schemas.microsoft.com/office/drawing/2014/main" id="{13D901DE-DB59-4753-BC62-43A425C47729}"/>
+                </a:ext>
+              </a:extLst>
+            </p:cNvPr>
+            <p:cNvSpPr txBox="1"/>
+            <p:nvPr/>
+          </p:nvSpPr>
+          <p:spPr>
+            <a:xfrm>
+              <a:off x="3277984" y="1973381"/>
+              <a:ext cx="1698171" cy="369332"/>
+            </a:xfrm>
+            <a:prstGeom prst="rect">
+              <a:avLst/>
+            </a:prstGeom>
+            <a:noFill/>
+          </p:spPr>
+          <p:txBody>
+            <a:bodyPr wrap="square" rtlCol="0">
+              <a:spAutoFit/>
+            </a:bodyPr>
+            <a:lstStyle/>
+            <a:p>
+              <a:pPr algn="ctr"/>
+              <a:r>
+                <a:rPr lang="en-US" dirty="0">
+                  <a:solidFill>
+                    <a:schemeClr val="bg1"/>
+                  </a:solidFill>
+                  <a:latin typeface="Avenir LT Std 65 Medium" panose="020B0803020203020204" pitchFamily="34" charset="0"/>
+                </a:rPr>
+                <a:t>Dataset 1</a:t>
+              </a:r>
+            </a:p>
+          </p:txBody>
+        </p:sp>
+      </p:grpSp>
     </p:spTree>
     <p:extLst>
       <p:ext uri="{BB962C8B-B14F-4D97-AF65-F5344CB8AC3E}">
-        <p14:creationId xmlns:p14="http://schemas.microsoft.com/office/powerpoint/2010/main" val="549630934"/>
+        <p14:creationId xmlns:p14="http://schemas.microsoft.com/office/powerpoint/2010/main" val="2610551249"/>
       </p:ext>
     </p:extLst>
   </p:cSld>

</xml_diff>